<commit_message>
- ViveTrackersDocumentation.pdf updated : chapters added (Unity3D plugin usage / SteamVR configuration / Optimize tracking reliability)
</commit_message>
<xml_diff>
--- a/Doc/ViveTrackersDocumentation.pptx
+++ b/Doc/ViveTrackersDocumentation.pptx
@@ -6,15 +6,17 @@
   </p:sldMasterIdLst>
   <p:sldIdLst>
     <p:sldId id="262" r:id="rId2"/>
-    <p:sldId id="257" r:id="rId3"/>
-    <p:sldId id="266" r:id="rId4"/>
+    <p:sldId id="269" r:id="rId3"/>
+    <p:sldId id="257" r:id="rId4"/>
     <p:sldId id="256" r:id="rId5"/>
-    <p:sldId id="265" r:id="rId6"/>
-    <p:sldId id="263" r:id="rId7"/>
-    <p:sldId id="258" r:id="rId8"/>
-    <p:sldId id="264" r:id="rId9"/>
-    <p:sldId id="260" r:id="rId10"/>
-    <p:sldId id="261" r:id="rId11"/>
+    <p:sldId id="266" r:id="rId6"/>
+    <p:sldId id="265" r:id="rId7"/>
+    <p:sldId id="263" r:id="rId8"/>
+    <p:sldId id="258" r:id="rId9"/>
+    <p:sldId id="264" r:id="rId10"/>
+    <p:sldId id="268" r:id="rId11"/>
+    <p:sldId id="260" r:id="rId12"/>
+    <p:sldId id="261" r:id="rId13"/>
   </p:sldIdLst>
   <p:sldSz cx="12192000" cy="6858000"/>
   <p:notesSz cx="6858000" cy="9144000"/>
@@ -268,7 +270,7 @@
           <a:p>
             <a:fld id="{56EB39F1-3B88-4C1E-8886-31D5FE341453}" type="datetimeFigureOut">
               <a:rPr lang="fr-FR" smtClean="0"/>
-              <a:t>09/06/2020</a:t>
+              <a:t>27/02/2021</a:t>
             </a:fld>
             <a:endParaRPr lang="fr-FR"/>
           </a:p>
@@ -466,7 +468,7 @@
           <a:p>
             <a:fld id="{56EB39F1-3B88-4C1E-8886-31D5FE341453}" type="datetimeFigureOut">
               <a:rPr lang="fr-FR" smtClean="0"/>
-              <a:t>09/06/2020</a:t>
+              <a:t>27/02/2021</a:t>
             </a:fld>
             <a:endParaRPr lang="fr-FR"/>
           </a:p>
@@ -674,7 +676,7 @@
           <a:p>
             <a:fld id="{56EB39F1-3B88-4C1E-8886-31D5FE341453}" type="datetimeFigureOut">
               <a:rPr lang="fr-FR" smtClean="0"/>
-              <a:t>09/06/2020</a:t>
+              <a:t>27/02/2021</a:t>
             </a:fld>
             <a:endParaRPr lang="fr-FR"/>
           </a:p>
@@ -872,7 +874,7 @@
           <a:p>
             <a:fld id="{56EB39F1-3B88-4C1E-8886-31D5FE341453}" type="datetimeFigureOut">
               <a:rPr lang="fr-FR" smtClean="0"/>
-              <a:t>09/06/2020</a:t>
+              <a:t>27/02/2021</a:t>
             </a:fld>
             <a:endParaRPr lang="fr-FR"/>
           </a:p>
@@ -1147,7 +1149,7 @@
           <a:p>
             <a:fld id="{56EB39F1-3B88-4C1E-8886-31D5FE341453}" type="datetimeFigureOut">
               <a:rPr lang="fr-FR" smtClean="0"/>
-              <a:t>09/06/2020</a:t>
+              <a:t>27/02/2021</a:t>
             </a:fld>
             <a:endParaRPr lang="fr-FR"/>
           </a:p>
@@ -1412,7 +1414,7 @@
           <a:p>
             <a:fld id="{56EB39F1-3B88-4C1E-8886-31D5FE341453}" type="datetimeFigureOut">
               <a:rPr lang="fr-FR" smtClean="0"/>
-              <a:t>09/06/2020</a:t>
+              <a:t>27/02/2021</a:t>
             </a:fld>
             <a:endParaRPr lang="fr-FR"/>
           </a:p>
@@ -1824,7 +1826,7 @@
           <a:p>
             <a:fld id="{56EB39F1-3B88-4C1E-8886-31D5FE341453}" type="datetimeFigureOut">
               <a:rPr lang="fr-FR" smtClean="0"/>
-              <a:t>09/06/2020</a:t>
+              <a:t>27/02/2021</a:t>
             </a:fld>
             <a:endParaRPr lang="fr-FR"/>
           </a:p>
@@ -1965,7 +1967,7 @@
           <a:p>
             <a:fld id="{56EB39F1-3B88-4C1E-8886-31D5FE341453}" type="datetimeFigureOut">
               <a:rPr lang="fr-FR" smtClean="0"/>
-              <a:t>09/06/2020</a:t>
+              <a:t>27/02/2021</a:t>
             </a:fld>
             <a:endParaRPr lang="fr-FR"/>
           </a:p>
@@ -2078,7 +2080,7 @@
           <a:p>
             <a:fld id="{56EB39F1-3B88-4C1E-8886-31D5FE341453}" type="datetimeFigureOut">
               <a:rPr lang="fr-FR" smtClean="0"/>
-              <a:t>09/06/2020</a:t>
+              <a:t>27/02/2021</a:t>
             </a:fld>
             <a:endParaRPr lang="fr-FR"/>
           </a:p>
@@ -2389,7 +2391,7 @@
           <a:p>
             <a:fld id="{56EB39F1-3B88-4C1E-8886-31D5FE341453}" type="datetimeFigureOut">
               <a:rPr lang="fr-FR" smtClean="0"/>
-              <a:t>09/06/2020</a:t>
+              <a:t>27/02/2021</a:t>
             </a:fld>
             <a:endParaRPr lang="fr-FR"/>
           </a:p>
@@ -2677,7 +2679,7 @@
           <a:p>
             <a:fld id="{56EB39F1-3B88-4C1E-8886-31D5FE341453}" type="datetimeFigureOut">
               <a:rPr lang="fr-FR" smtClean="0"/>
-              <a:t>09/06/2020</a:t>
+              <a:t>27/02/2021</a:t>
             </a:fld>
             <a:endParaRPr lang="fr-FR"/>
           </a:p>
@@ -2918,7 +2920,7 @@
           <a:p>
             <a:fld id="{56EB39F1-3B88-4C1E-8886-31D5FE341453}" type="datetimeFigureOut">
               <a:rPr lang="fr-FR" smtClean="0"/>
-              <a:t>09/06/2020</a:t>
+              <a:t>27/02/2021</a:t>
             </a:fld>
             <a:endParaRPr lang="fr-FR"/>
           </a:p>
@@ -3353,8 +3355,8 @@
         </p:nvSpPr>
         <p:spPr>
           <a:xfrm>
-            <a:off x="1192530" y="2235200"/>
-            <a:ext cx="9806940" cy="2387600"/>
+            <a:off x="0" y="-1"/>
+            <a:ext cx="12192000" cy="3259567"/>
           </a:xfrm>
         </p:spPr>
         <p:txBody>
@@ -3362,9 +3364,148 @@
           <a:lstStyle/>
           <a:p>
             <a:r>
-              <a:rPr lang="fr-FR" dirty="0"/>
-              <a:t>Vive Trackers for Unity3D</a:t>
-            </a:r>
+              <a:rPr lang="fr-FR" b="1" dirty="0"/>
+              <a:t>Vive Trackers for </a:t>
+            </a:r>
+            <a:r>
+              <a:rPr lang="fr-FR" b="1" dirty="0" smtClean="0"/>
+              <a:t>Unity3D</a:t>
+            </a:r>
+            <a:endParaRPr lang="fr-FR" b="1" dirty="0"/>
+          </a:p>
+        </p:txBody>
+      </p:sp>
+      <p:sp>
+        <p:nvSpPr>
+          <p:cNvPr id="3" name="Titre 1">
+            <a:extLst>
+              <a:ext uri="{FF2B5EF4-FFF2-40B4-BE49-F238E27FC236}">
+                <a16:creationId xmlns:a16="http://schemas.microsoft.com/office/drawing/2014/main" id="{CD27C932-A795-4BDA-8F0E-5A1627F64C61}"/>
+              </a:ext>
+            </a:extLst>
+          </p:cNvPr>
+          <p:cNvSpPr txBox="1">
+            <a:spLocks/>
+          </p:cNvSpPr>
+          <p:nvPr/>
+        </p:nvSpPr>
+        <p:spPr>
+          <a:xfrm>
+            <a:off x="0" y="2235200"/>
+            <a:ext cx="12192000" cy="4622800"/>
+          </a:xfrm>
+          <a:prstGeom prst="rect">
+            <a:avLst/>
+          </a:prstGeom>
+        </p:spPr>
+        <p:txBody>
+          <a:bodyPr vert="horz" lIns="91440" tIns="45720" rIns="91440" bIns="45720" rtlCol="0" anchor="ctr">
+            <a:normAutofit/>
+          </a:bodyPr>
+          <a:lstStyle>
+            <a:lvl1pPr algn="ctr" defTabSz="914400" rtl="0" eaLnBrk="1" latinLnBrk="0" hangingPunct="1">
+              <a:lnSpc>
+                <a:spcPct val="90000"/>
+              </a:lnSpc>
+              <a:spcBef>
+                <a:spcPct val="0"/>
+              </a:spcBef>
+              <a:buNone/>
+              <a:defRPr sz="6000" kern="1200">
+                <a:solidFill>
+                  <a:schemeClr val="tx1"/>
+                </a:solidFill>
+                <a:latin typeface="+mj-lt"/>
+                <a:ea typeface="+mj-ea"/>
+                <a:cs typeface="+mj-cs"/>
+              </a:defRPr>
+            </a:lvl1pPr>
+          </a:lstStyle>
+          <a:p>
+            <a:pPr algn="l"/>
+            <a:r>
+              <a:rPr lang="fr-FR" sz="5400" dirty="0"/>
+              <a:t>	</a:t>
+            </a:r>
+            <a:r>
+              <a:rPr lang="fr-FR" sz="5400" dirty="0" smtClean="0"/>
+              <a:t>1. </a:t>
+            </a:r>
+            <a:r>
+              <a:rPr lang="fr-FR" sz="5400" dirty="0" smtClean="0">
+                <a:hlinkClick r:id="rId2" action="ppaction://hlinksldjump"/>
+              </a:rPr>
+              <a:t>Unity3D plugin usage</a:t>
+            </a:r>
+            <a:endParaRPr lang="fr-FR" sz="5400" dirty="0" smtClean="0"/>
+          </a:p>
+          <a:p>
+            <a:pPr algn="l"/>
+            <a:endParaRPr lang="fr-FR" sz="2000" dirty="0" smtClean="0"/>
+          </a:p>
+          <a:p>
+            <a:pPr algn="l"/>
+            <a:r>
+              <a:rPr lang="fr-FR" sz="5400" dirty="0" smtClean="0"/>
+              <a:t>	2</a:t>
+            </a:r>
+            <a:r>
+              <a:rPr lang="fr-FR" sz="5400" dirty="0"/>
+              <a:t>. </a:t>
+            </a:r>
+            <a:r>
+              <a:rPr lang="fr-FR" sz="5400" dirty="0" err="1">
+                <a:hlinkClick r:id="rId3" action="ppaction://hlinksldjump"/>
+              </a:rPr>
+              <a:t>SteamVR</a:t>
+            </a:r>
+            <a:r>
+              <a:rPr lang="fr-FR" sz="5400" dirty="0">
+                <a:hlinkClick r:id="rId3" action="ppaction://hlinksldjump"/>
+              </a:rPr>
+              <a:t> </a:t>
+            </a:r>
+            <a:r>
+              <a:rPr lang="fr-FR" sz="5400" dirty="0">
+                <a:hlinkClick r:id="rId3" action="ppaction://hlinksldjump"/>
+              </a:rPr>
+              <a:t>configuration</a:t>
+            </a:r>
+            <a:endParaRPr lang="fr-FR" sz="5400" dirty="0"/>
+          </a:p>
+          <a:p>
+            <a:pPr algn="l"/>
+            <a:endParaRPr lang="fr-FR" sz="2000" dirty="0" smtClean="0"/>
+          </a:p>
+          <a:p>
+            <a:pPr algn="l"/>
+            <a:r>
+              <a:rPr lang="fr-FR" sz="5400" dirty="0" smtClean="0"/>
+              <a:t>	3</a:t>
+            </a:r>
+            <a:r>
+              <a:rPr lang="fr-FR" sz="5400" dirty="0"/>
+              <a:t>. </a:t>
+            </a:r>
+            <a:r>
+              <a:rPr lang="en-US" sz="5400" dirty="0">
+                <a:hlinkClick r:id="rId4" action="ppaction://hlinksldjump"/>
+              </a:rPr>
+              <a:t>Optimize </a:t>
+            </a:r>
+            <a:r>
+              <a:rPr lang="en-US" sz="5400" dirty="0" smtClean="0">
+                <a:hlinkClick r:id="rId4" action="ppaction://hlinksldjump"/>
+              </a:rPr>
+              <a:t>tracking </a:t>
+            </a:r>
+            <a:r>
+              <a:rPr lang="en-US" sz="5400" dirty="0">
+                <a:hlinkClick r:id="rId4" action="ppaction://hlinksldjump"/>
+              </a:rPr>
+              <a:t>reliability</a:t>
+            </a:r>
+            <a:endParaRPr lang="fr-FR" sz="5400" dirty="0"/>
           </a:p>
         </p:txBody>
       </p:sp>
@@ -3382,6 +3523,416 @@
 </file>
 
 <file path=ppt/slides/slide10.xml><?xml version="1.0" encoding="utf-8"?>
+<p:sld xmlns:a="http://schemas.openxmlformats.org/drawingml/2006/main" xmlns:r="http://schemas.openxmlformats.org/officeDocument/2006/relationships" xmlns:p="http://schemas.openxmlformats.org/presentationml/2006/main">
+  <p:cSld>
+    <p:spTree>
+      <p:nvGrpSpPr>
+        <p:cNvPr id="1" name=""/>
+        <p:cNvGrpSpPr/>
+        <p:nvPr/>
+      </p:nvGrpSpPr>
+      <p:grpSpPr>
+        <a:xfrm>
+          <a:off x="0" y="0"/>
+          <a:ext cx="0" cy="0"/>
+          <a:chOff x="0" y="0"/>
+          <a:chExt cx="0" cy="0"/>
+        </a:xfrm>
+      </p:grpSpPr>
+      <p:sp>
+        <p:nvSpPr>
+          <p:cNvPr id="4" name="ZoneTexte 3">
+            <a:extLst>
+              <a:ext uri="{FF2B5EF4-FFF2-40B4-BE49-F238E27FC236}">
+                <a16:creationId xmlns:a16="http://schemas.microsoft.com/office/drawing/2014/main" id="{706B6FC1-E7CE-491D-820B-B3FBCE634F55}"/>
+              </a:ext>
+            </a:extLst>
+          </p:cNvPr>
+          <p:cNvSpPr txBox="1"/>
+          <p:nvPr/>
+        </p:nvSpPr>
+        <p:spPr>
+          <a:xfrm>
+            <a:off x="0" y="0"/>
+            <a:ext cx="12192000" cy="523220"/>
+          </a:xfrm>
+          <a:prstGeom prst="rect">
+            <a:avLst/>
+          </a:prstGeom>
+          <a:noFill/>
+        </p:spPr>
+        <p:txBody>
+          <a:bodyPr wrap="square" rtlCol="0">
+            <a:spAutoFit/>
+          </a:bodyPr>
+          <a:lstStyle/>
+          <a:p>
+            <a:r>
+              <a:rPr lang="fr-FR" sz="2800" dirty="0" err="1" smtClean="0"/>
+              <a:t>Tracking</a:t>
+            </a:r>
+            <a:r>
+              <a:rPr lang="fr-FR" sz="2800" dirty="0" smtClean="0"/>
+              <a:t> Setup</a:t>
+            </a:r>
+            <a:endParaRPr lang="fr-FR" sz="2800" dirty="0"/>
+          </a:p>
+        </p:txBody>
+      </p:sp>
+      <p:sp>
+        <p:nvSpPr>
+          <p:cNvPr id="5" name="Espace réservé du contenu 2">
+            <a:extLst>
+              <a:ext uri="{FF2B5EF4-FFF2-40B4-BE49-F238E27FC236}">
+                <a16:creationId xmlns:a16="http://schemas.microsoft.com/office/drawing/2014/main" id="{867BF634-B408-4057-AB03-965020275BA3}"/>
+              </a:ext>
+            </a:extLst>
+          </p:cNvPr>
+          <p:cNvSpPr>
+            <a:spLocks noGrp="1"/>
+          </p:cNvSpPr>
+          <p:nvPr>
+            <p:ph idx="1"/>
+          </p:nvPr>
+        </p:nvSpPr>
+        <p:spPr>
+          <a:xfrm>
+            <a:off x="0" y="715880"/>
+            <a:ext cx="12192000" cy="6142120"/>
+          </a:xfrm>
+        </p:spPr>
+        <p:txBody>
+          <a:bodyPr>
+            <a:normAutofit/>
+          </a:bodyPr>
+          <a:lstStyle/>
+          <a:p>
+            <a:pPr marL="0" indent="0" algn="just">
+              <a:buNone/>
+            </a:pPr>
+            <a:r>
+              <a:rPr lang="en-US" sz="2200" b="1" dirty="0" smtClean="0"/>
+              <a:t>1. Bluetooth dongles should be setup the farthest away from each others</a:t>
+            </a:r>
+            <a:r>
+              <a:rPr lang="en-US" sz="2200" dirty="0" smtClean="0"/>
+              <a:t>. This is the most influencing parameter to get good tracking results.</a:t>
+            </a:r>
+            <a:r>
+              <a:rPr lang="en-US" sz="2200" dirty="0" smtClean="0"/>
+              <a:t> We advise to use </a:t>
+            </a:r>
+            <a:r>
+              <a:rPr lang="en-US" sz="2200" dirty="0" err="1" smtClean="0"/>
+              <a:t>usb</a:t>
+            </a:r>
+            <a:r>
+              <a:rPr lang="en-US" sz="2200" dirty="0" smtClean="0"/>
+              <a:t> cables with 2m as minimum length, to avoid radio interferences between your Bluetooth dongles.</a:t>
+            </a:r>
+          </a:p>
+          <a:p>
+            <a:pPr algn="just"/>
+            <a:endParaRPr lang="en-US" sz="1000" dirty="0" smtClean="0"/>
+          </a:p>
+          <a:p>
+            <a:pPr marL="0" indent="0" algn="just">
+              <a:buNone/>
+            </a:pPr>
+            <a:r>
+              <a:rPr lang="en-US" sz="2200" b="1" dirty="0"/>
+              <a:t>2. Remove light reflection sources as possible in your tracking area (</a:t>
+            </a:r>
+            <a:r>
+              <a:rPr lang="en-US" sz="2200" b="1" dirty="0" err="1"/>
+              <a:t>e.g</a:t>
+            </a:r>
+            <a:r>
+              <a:rPr lang="en-US" sz="2200" b="1" dirty="0"/>
+              <a:t> : windows, mirrors,  and other reflective surfaces)</a:t>
+            </a:r>
+            <a:r>
+              <a:rPr lang="fr-FR" sz="2200" b="1" dirty="0"/>
+              <a:t>. </a:t>
+            </a:r>
+            <a:r>
+              <a:rPr lang="en-US" sz="2200" dirty="0" smtClean="0"/>
+              <a:t>Lighthouse tracking is really sensible to reflections (more information </a:t>
+            </a:r>
+            <a:r>
+              <a:rPr lang="en-US" sz="2200" dirty="0"/>
+              <a:t>: </a:t>
+            </a:r>
+            <a:r>
+              <a:rPr lang="en-US" sz="2200" dirty="0">
+                <a:hlinkClick r:id="rId2"/>
+              </a:rPr>
+              <a:t>https://</a:t>
+            </a:r>
+            <a:r>
+              <a:rPr lang="en-US" sz="2200" dirty="0" smtClean="0">
+                <a:hlinkClick r:id="rId2"/>
+              </a:rPr>
+              <a:t>xinreality.com/wiki/Lighthouse</a:t>
+            </a:r>
+            <a:r>
+              <a:rPr lang="en-US" sz="2200" dirty="0" smtClean="0"/>
+              <a:t>).</a:t>
+            </a:r>
+            <a:endParaRPr lang="en-US" sz="2200" b="1" dirty="0" smtClean="0"/>
+          </a:p>
+          <a:p>
+            <a:endParaRPr lang="fr-FR" sz="1000" b="1" dirty="0"/>
+          </a:p>
+          <a:p>
+            <a:pPr marL="0" indent="0">
+              <a:buNone/>
+            </a:pPr>
+            <a:r>
+              <a:rPr lang="en-US" sz="2200" b="1" dirty="0" smtClean="0"/>
+              <a:t>3. Base stations should be setup not to far away from each others.</a:t>
+            </a:r>
+          </a:p>
+          <a:p>
+            <a:r>
+              <a:rPr lang="en-US" sz="2000" dirty="0" smtClean="0"/>
+              <a:t>When using 2x Base stations, use HTC recommendations </a:t>
+            </a:r>
+            <a:r>
+              <a:rPr lang="en-US" sz="2000" dirty="0"/>
+              <a:t>: </a:t>
+            </a:r>
+            <a:r>
+              <a:rPr lang="en-US" sz="2000" dirty="0">
+                <a:hlinkClick r:id="rId3"/>
+              </a:rPr>
+              <a:t>https://</a:t>
+            </a:r>
+            <a:r>
+              <a:rPr lang="en-US" sz="2000" dirty="0" smtClean="0">
+                <a:hlinkClick r:id="rId3"/>
+              </a:rPr>
+              <a:t>www.vive.com/fr/support/vive/category_howto/tips-for-setting-up-the-base-stations.html</a:t>
+            </a:r>
+            <a:endParaRPr lang="en-US" sz="2000" dirty="0" smtClean="0"/>
+          </a:p>
+          <a:p>
+            <a:r>
+              <a:rPr lang="en-US" sz="2000" dirty="0" smtClean="0"/>
+              <a:t>When using 4x Base stations, use this process to place your base stations to get a good tracking quality : </a:t>
+            </a:r>
+          </a:p>
+          <a:p>
+            <a:pPr marL="457200" lvl="1" indent="0" algn="just">
+              <a:buNone/>
+            </a:pPr>
+            <a:r>
+              <a:rPr lang="en-US" sz="1600" dirty="0" smtClean="0"/>
+              <a:t>- </a:t>
+            </a:r>
+            <a:r>
+              <a:rPr lang="en-US" sz="1600" b="1" dirty="0" smtClean="0"/>
+              <a:t>Physically place your Base stations as a rectangle shape</a:t>
+            </a:r>
+            <a:r>
+              <a:rPr lang="en-US" sz="1600" dirty="0" smtClean="0"/>
+              <a:t> (</a:t>
+            </a:r>
+            <a:r>
+              <a:rPr lang="en-US" sz="1600" dirty="0" err="1" smtClean="0"/>
+              <a:t>e.g</a:t>
+            </a:r>
+            <a:r>
+              <a:rPr lang="en-US" sz="1600" dirty="0" smtClean="0"/>
+              <a:t> the 4 corners of a room)</a:t>
+            </a:r>
+          </a:p>
+          <a:p>
+            <a:pPr marL="457200" lvl="1" indent="0" algn="just">
+              <a:buNone/>
+            </a:pPr>
+            <a:r>
+              <a:rPr lang="en-US" sz="1600" dirty="0" smtClean="0"/>
+              <a:t>- do the </a:t>
+            </a:r>
+            <a:r>
+              <a:rPr lang="en-US" sz="1600" b="1" dirty="0" err="1" smtClean="0"/>
+              <a:t>SteamVR</a:t>
+            </a:r>
+            <a:r>
+              <a:rPr lang="en-US" sz="1600" b="1" dirty="0" smtClean="0"/>
+              <a:t> Room calibration using the 4 corners technic</a:t>
+            </a:r>
+            <a:endParaRPr lang="en-US" sz="1600" dirty="0" smtClean="0"/>
+          </a:p>
+          <a:p>
+            <a:pPr marL="457200" lvl="1" indent="0" algn="just">
+              <a:buNone/>
+            </a:pPr>
+            <a:r>
+              <a:rPr lang="en-US" sz="1600" dirty="0" smtClean="0"/>
+              <a:t>- mark each Room’s corner taking care to physically </a:t>
+            </a:r>
+            <a:r>
+              <a:rPr lang="en-US" sz="1600" b="1" dirty="0" smtClean="0"/>
+              <a:t>place your Vive Controller just below each Base station</a:t>
+            </a:r>
+            <a:r>
+              <a:rPr lang="en-US" sz="1600" dirty="0" smtClean="0"/>
+              <a:t> (the Vive controller position  and the Base station position should be the same 2D position on the </a:t>
+            </a:r>
+            <a:r>
+              <a:rPr lang="en-US" sz="1600" dirty="0" err="1" smtClean="0"/>
+              <a:t>SteamVR</a:t>
+            </a:r>
+            <a:r>
+              <a:rPr lang="en-US" sz="1600" dirty="0" smtClean="0"/>
+              <a:t> calibration 2D view).</a:t>
+            </a:r>
+          </a:p>
+          <a:p>
+            <a:pPr marL="457200" lvl="1" indent="0" algn="just">
+              <a:buNone/>
+            </a:pPr>
+            <a:r>
+              <a:rPr lang="en-US" sz="1600" dirty="0" smtClean="0"/>
+              <a:t>- when the 4 corners are defined, </a:t>
+            </a:r>
+            <a:r>
+              <a:rPr lang="en-US" sz="1600" b="1" dirty="0" err="1" smtClean="0"/>
+              <a:t>SteamVR</a:t>
+            </a:r>
+            <a:r>
+              <a:rPr lang="en-US" sz="1600" b="1" dirty="0" smtClean="0"/>
+              <a:t> calibration should produce a rectangle with every angles corresponding exactly to the base stations’ positions</a:t>
+            </a:r>
+            <a:r>
+              <a:rPr lang="en-US" sz="1600" dirty="0" smtClean="0"/>
+              <a:t> (as you defined previously). If one of the rectangle’s angle is not located at its corresponding Base station position, it means the corresponding Base Station is too far away from the others Base stations : you have to physically move it closer.</a:t>
+            </a:r>
+            <a:endParaRPr lang="en-US" sz="1200" dirty="0" smtClean="0"/>
+          </a:p>
+          <a:p>
+            <a:pPr lvl="1"/>
+            <a:endParaRPr lang="en-US" sz="1600" b="1" dirty="0" smtClean="0"/>
+          </a:p>
+        </p:txBody>
+      </p:sp>
+    </p:spTree>
+    <p:extLst>
+      <p:ext uri="{BB962C8B-B14F-4D97-AF65-F5344CB8AC3E}">
+        <p14:creationId xmlns:p14="http://schemas.microsoft.com/office/powerpoint/2010/main" val="2523498392"/>
+      </p:ext>
+    </p:extLst>
+  </p:cSld>
+  <p:clrMapOvr>
+    <a:masterClrMapping/>
+  </p:clrMapOvr>
+</p:sld>
+</file>
+
+<file path=ppt/slides/slide11.xml><?xml version="1.0" encoding="utf-8"?>
+<p:sld xmlns:a="http://schemas.openxmlformats.org/drawingml/2006/main" xmlns:r="http://schemas.openxmlformats.org/officeDocument/2006/relationships" xmlns:p="http://schemas.openxmlformats.org/presentationml/2006/main">
+  <p:cSld>
+    <p:spTree>
+      <p:nvGrpSpPr>
+        <p:cNvPr id="1" name=""/>
+        <p:cNvGrpSpPr/>
+        <p:nvPr/>
+      </p:nvGrpSpPr>
+      <p:grpSpPr>
+        <a:xfrm>
+          <a:off x="0" y="0"/>
+          <a:ext cx="0" cy="0"/>
+          <a:chOff x="0" y="0"/>
+          <a:chExt cx="0" cy="0"/>
+        </a:xfrm>
+      </p:grpSpPr>
+      <p:sp>
+        <p:nvSpPr>
+          <p:cNvPr id="4" name="ZoneTexte 3">
+            <a:extLst>
+              <a:ext uri="{FF2B5EF4-FFF2-40B4-BE49-F238E27FC236}">
+                <a16:creationId xmlns:a16="http://schemas.microsoft.com/office/drawing/2014/main" id="{706B6FC1-E7CE-491D-820B-B3FBCE634F55}"/>
+              </a:ext>
+            </a:extLst>
+          </p:cNvPr>
+          <p:cNvSpPr txBox="1"/>
+          <p:nvPr/>
+        </p:nvSpPr>
+        <p:spPr>
+          <a:xfrm>
+            <a:off x="0" y="0"/>
+            <a:ext cx="12192000" cy="523220"/>
+          </a:xfrm>
+          <a:prstGeom prst="rect">
+            <a:avLst/>
+          </a:prstGeom>
+          <a:noFill/>
+        </p:spPr>
+        <p:txBody>
+          <a:bodyPr wrap="square" rtlCol="0">
+            <a:spAutoFit/>
+          </a:bodyPr>
+          <a:lstStyle/>
+          <a:p>
+            <a:r>
+              <a:rPr lang="fr-FR" sz="2800" dirty="0"/>
+              <a:t>Configure Windows Power Options</a:t>
+            </a:r>
+          </a:p>
+        </p:txBody>
+      </p:sp>
+      <p:pic>
+        <p:nvPicPr>
+          <p:cNvPr id="6" name="Image 5" descr="Une image contenant capture d’écran&#10;&#10;Description générée automatiquement">
+            <a:extLst>
+              <a:ext uri="{FF2B5EF4-FFF2-40B4-BE49-F238E27FC236}">
+                <a16:creationId xmlns:a16="http://schemas.microsoft.com/office/drawing/2014/main" id="{DC7BADEE-3314-462E-9A28-6B40B002DAE7}"/>
+              </a:ext>
+            </a:extLst>
+          </p:cNvPr>
+          <p:cNvPicPr>
+            <a:picLocks noChangeAspect="1"/>
+          </p:cNvPicPr>
+          <p:nvPr/>
+        </p:nvPicPr>
+        <p:blipFill>
+          <a:blip r:embed="rId2">
+            <a:extLst>
+              <a:ext uri="{28A0092B-C50C-407E-A947-70E740481C1C}">
+                <a14:useLocalDpi xmlns:a14="http://schemas.microsoft.com/office/drawing/2010/main" val="0"/>
+              </a:ext>
+            </a:extLst>
+          </a:blip>
+          <a:stretch>
+            <a:fillRect/>
+          </a:stretch>
+        </p:blipFill>
+        <p:spPr>
+          <a:xfrm>
+            <a:off x="1250156" y="523220"/>
+            <a:ext cx="9179719" cy="6250021"/>
+          </a:xfrm>
+          <a:prstGeom prst="rect">
+            <a:avLst/>
+          </a:prstGeom>
+        </p:spPr>
+      </p:pic>
+    </p:spTree>
+    <p:extLst>
+      <p:ext uri="{BB962C8B-B14F-4D97-AF65-F5344CB8AC3E}">
+        <p14:creationId xmlns:p14="http://schemas.microsoft.com/office/powerpoint/2010/main" val="1255640821"/>
+      </p:ext>
+    </p:extLst>
+  </p:cSld>
+  <p:clrMapOvr>
+    <a:masterClrMapping/>
+  </p:clrMapOvr>
+</p:sld>
+</file>
+
+<file path=ppt/slides/slide12.xml><?xml version="1.0" encoding="utf-8"?>
 <p:sld xmlns:a="http://schemas.openxmlformats.org/drawingml/2006/main" xmlns:r="http://schemas.openxmlformats.org/officeDocument/2006/relationships" xmlns:p="http://schemas.openxmlformats.org/presentationml/2006/main">
   <p:cSld>
     <p:spTree>
@@ -3644,6 +4195,74 @@
       </p:grpSpPr>
       <p:sp>
         <p:nvSpPr>
+          <p:cNvPr id="2" name="Titre 1">
+            <a:extLst>
+              <a:ext uri="{FF2B5EF4-FFF2-40B4-BE49-F238E27FC236}">
+                <a16:creationId xmlns:a16="http://schemas.microsoft.com/office/drawing/2014/main" id="{CD27C932-A795-4BDA-8F0E-5A1627F64C61}"/>
+              </a:ext>
+            </a:extLst>
+          </p:cNvPr>
+          <p:cNvSpPr>
+            <a:spLocks noGrp="1"/>
+          </p:cNvSpPr>
+          <p:nvPr>
+            <p:ph type="ctrTitle"/>
+          </p:nvPr>
+        </p:nvSpPr>
+        <p:spPr>
+          <a:xfrm>
+            <a:off x="1192530" y="2235200"/>
+            <a:ext cx="9806940" cy="2387600"/>
+          </a:xfrm>
+        </p:spPr>
+        <p:txBody>
+          <a:bodyPr anchor="ctr"/>
+          <a:lstStyle/>
+          <a:p>
+            <a:r>
+              <a:rPr lang="fr-FR" dirty="0" smtClean="0"/>
+              <a:t>1. </a:t>
+            </a:r>
+            <a:r>
+              <a:rPr lang="fr-FR" dirty="0"/>
+              <a:t>Unity3D plugin usage</a:t>
+            </a:r>
+            <a:endParaRPr lang="fr-FR" dirty="0"/>
+          </a:p>
+        </p:txBody>
+      </p:sp>
+    </p:spTree>
+    <p:extLst>
+      <p:ext uri="{BB962C8B-B14F-4D97-AF65-F5344CB8AC3E}">
+        <p14:creationId xmlns:p14="http://schemas.microsoft.com/office/powerpoint/2010/main" val="2734837422"/>
+      </p:ext>
+    </p:extLst>
+  </p:cSld>
+  <p:clrMapOvr>
+    <a:masterClrMapping/>
+  </p:clrMapOvr>
+</p:sld>
+</file>
+
+<file path=ppt/slides/slide3.xml><?xml version="1.0" encoding="utf-8"?>
+<p:sld xmlns:a="http://schemas.openxmlformats.org/drawingml/2006/main" xmlns:r="http://schemas.openxmlformats.org/officeDocument/2006/relationships" xmlns:p="http://schemas.openxmlformats.org/presentationml/2006/main">
+  <p:cSld>
+    <p:spTree>
+      <p:nvGrpSpPr>
+        <p:cNvPr id="1" name=""/>
+        <p:cNvGrpSpPr/>
+        <p:nvPr/>
+      </p:nvGrpSpPr>
+      <p:grpSpPr>
+        <a:xfrm>
+          <a:off x="0" y="0"/>
+          <a:ext cx="0" cy="0"/>
+          <a:chOff x="0" y="0"/>
+          <a:chExt cx="0" cy="0"/>
+        </a:xfrm>
+      </p:grpSpPr>
+      <p:sp>
+        <p:nvSpPr>
           <p:cNvPr id="3" name="Espace réservé du contenu 2">
             <a:extLst>
               <a:ext uri="{FF2B5EF4-FFF2-40B4-BE49-F238E27FC236}">
@@ -3913,7 +4532,23 @@
                   <a:srgbClr val="FF0000"/>
                 </a:solidFill>
               </a:rPr>
-              <a:t> or an executable) is running. If not, you should expect Vive Trackers connections issues !!!</a:t>
+              <a:t> or an executable) is running. If not, you should expect Vive Trackers </a:t>
+            </a:r>
+            <a:r>
+              <a:rPr lang="en-US" sz="2200" b="1" dirty="0" smtClean="0">
+                <a:solidFill>
+                  <a:srgbClr val="FF0000"/>
+                </a:solidFill>
+              </a:rPr>
+              <a:t>disconnections </a:t>
+            </a:r>
+            <a:r>
+              <a:rPr lang="en-US" sz="2200" b="1" dirty="0">
+                <a:solidFill>
+                  <a:srgbClr val="FF0000"/>
+                </a:solidFill>
+              </a:rPr>
+              <a:t>issues !!!</a:t>
             </a:r>
           </a:p>
         </p:txBody>
@@ -4068,622 +4703,6 @@
 </p:sld>
 </file>
 
-<file path=ppt/slides/slide3.xml><?xml version="1.0" encoding="utf-8"?>
-<p:sld xmlns:a="http://schemas.openxmlformats.org/drawingml/2006/main" xmlns:r="http://schemas.openxmlformats.org/officeDocument/2006/relationships" xmlns:p="http://schemas.openxmlformats.org/presentationml/2006/main">
-  <p:cSld>
-    <p:spTree>
-      <p:nvGrpSpPr>
-        <p:cNvPr id="1" name=""/>
-        <p:cNvGrpSpPr/>
-        <p:nvPr/>
-      </p:nvGrpSpPr>
-      <p:grpSpPr>
-        <a:xfrm>
-          <a:off x="0" y="0"/>
-          <a:ext cx="0" cy="0"/>
-          <a:chOff x="0" y="0"/>
-          <a:chExt cx="0" cy="0"/>
-        </a:xfrm>
-      </p:grpSpPr>
-      <p:sp>
-        <p:nvSpPr>
-          <p:cNvPr id="3" name="Sous-titre 2">
-            <a:extLst>
-              <a:ext uri="{FF2B5EF4-FFF2-40B4-BE49-F238E27FC236}">
-                <a16:creationId xmlns:a16="http://schemas.microsoft.com/office/drawing/2014/main" id="{EBB0C4BD-6D46-496F-9459-88A9D2FA1908}"/>
-              </a:ext>
-            </a:extLst>
-          </p:cNvPr>
-          <p:cNvSpPr>
-            <a:spLocks noGrp="1"/>
-          </p:cNvSpPr>
-          <p:nvPr>
-            <p:ph type="subTitle" idx="1"/>
-          </p:nvPr>
-        </p:nvSpPr>
-        <p:spPr>
-          <a:xfrm>
-            <a:off x="0" y="745436"/>
-            <a:ext cx="12192000" cy="5993294"/>
-          </a:xfrm>
-        </p:spPr>
-        <p:txBody>
-          <a:bodyPr>
-            <a:normAutofit lnSpcReduction="10000"/>
-          </a:bodyPr>
-          <a:lstStyle/>
-          <a:p>
-            <a:pPr algn="just">
-              <a:spcBef>
-                <a:spcPts val="0"/>
-              </a:spcBef>
-            </a:pPr>
-            <a:r>
-              <a:rPr lang="en-US" sz="2000" dirty="0"/>
-              <a:t>When</a:t>
-            </a:r>
-            <a:r>
-              <a:rPr lang="fr-FR" sz="2000" dirty="0"/>
-              <a:t> </a:t>
-            </a:r>
-            <a:r>
-              <a:rPr lang="en-US" sz="2000" dirty="0"/>
-              <a:t>using</a:t>
-            </a:r>
-            <a:r>
-              <a:rPr lang="fr-FR" sz="2000" dirty="0"/>
-              <a:t> Vive Trackers, one </a:t>
-            </a:r>
-            <a:r>
-              <a:rPr lang="en-US" sz="2000" dirty="0"/>
-              <a:t>problem</a:t>
-            </a:r>
-            <a:r>
-              <a:rPr lang="fr-FR" sz="2000" dirty="0"/>
-              <a:t> </a:t>
-            </a:r>
-            <a:r>
-              <a:rPr lang="en-US" sz="2000" dirty="0"/>
-              <a:t>is</a:t>
-            </a:r>
-            <a:r>
-              <a:rPr lang="fr-FR" sz="2000" dirty="0"/>
-              <a:t> to </a:t>
-            </a:r>
-            <a:r>
-              <a:rPr lang="en-US" sz="2000" dirty="0"/>
-              <a:t>guarantee</a:t>
-            </a:r>
-            <a:r>
-              <a:rPr lang="fr-FR" sz="2000" dirty="0"/>
-              <a:t> </a:t>
-            </a:r>
-            <a:r>
-              <a:rPr lang="en-US" sz="2000" dirty="0"/>
-              <a:t>that</a:t>
-            </a:r>
-            <a:r>
-              <a:rPr lang="fr-FR" sz="2000" dirty="0"/>
-              <a:t> a </a:t>
-            </a:r>
-            <a:r>
-              <a:rPr lang="en-US" sz="2000" dirty="0"/>
-              <a:t>given</a:t>
-            </a:r>
-            <a:r>
-              <a:rPr lang="fr-FR" sz="2000" dirty="0"/>
-              <a:t> </a:t>
-            </a:r>
-            <a:r>
-              <a:rPr lang="fr-FR" sz="2000" b="1" dirty="0"/>
-              <a:t>Vive Tracker </a:t>
-            </a:r>
-            <a:r>
-              <a:rPr lang="en-US" sz="2000" b="1" dirty="0"/>
-              <a:t>device</a:t>
-            </a:r>
-            <a:r>
-              <a:rPr lang="fr-FR" sz="2000" dirty="0"/>
-              <a:t> </a:t>
-            </a:r>
-            <a:r>
-              <a:rPr lang="en-US" sz="2000" dirty="0"/>
-              <a:t>is</a:t>
-            </a:r>
-            <a:r>
-              <a:rPr lang="fr-FR" sz="2000" dirty="0"/>
-              <a:t> </a:t>
-            </a:r>
-            <a:r>
-              <a:rPr lang="en-US" sz="2000" dirty="0"/>
-              <a:t>always</a:t>
-            </a:r>
-            <a:r>
-              <a:rPr lang="fr-FR" sz="2000" dirty="0"/>
-              <a:t> </a:t>
-            </a:r>
-            <a:r>
-              <a:rPr lang="en-US" sz="2000" dirty="0"/>
-              <a:t>associated</a:t>
-            </a:r>
-            <a:r>
-              <a:rPr lang="fr-FR" sz="2000" dirty="0"/>
-              <a:t> to the </a:t>
-            </a:r>
-            <a:r>
-              <a:rPr lang="en-US" sz="2000" dirty="0"/>
-              <a:t>same</a:t>
-            </a:r>
-            <a:r>
-              <a:rPr lang="fr-FR" sz="2000" dirty="0"/>
-              <a:t> </a:t>
-            </a:r>
-            <a:r>
-              <a:rPr lang="en-US" sz="2000" b="1" dirty="0"/>
-              <a:t>Vive Tracker virtual object</a:t>
-            </a:r>
-            <a:r>
-              <a:rPr lang="en-US" sz="2000" dirty="0"/>
-              <a:t> (e.g. a </a:t>
-            </a:r>
-            <a:r>
-              <a:rPr lang="en-US" sz="2000" dirty="0" err="1"/>
-              <a:t>GameObject</a:t>
-            </a:r>
-            <a:r>
-              <a:rPr lang="en-US" sz="2000" dirty="0"/>
-              <a:t> with a </a:t>
-            </a:r>
-            <a:r>
-              <a:rPr lang="en-US" sz="2000" b="1" dirty="0" err="1"/>
-              <a:t>ViveTracker</a:t>
-            </a:r>
-            <a:r>
-              <a:rPr lang="en-US" sz="2000" dirty="0"/>
-              <a:t> script on it), </a:t>
-            </a:r>
-            <a:r>
-              <a:rPr lang="fr-FR" sz="2000" dirty="0"/>
-              <a:t>no </a:t>
-            </a:r>
-            <a:r>
-              <a:rPr lang="en-US" sz="2000" dirty="0"/>
-              <a:t>matter</a:t>
-            </a:r>
-            <a:r>
-              <a:rPr lang="fr-FR" sz="2000" dirty="0"/>
-              <a:t> </a:t>
-            </a:r>
-            <a:r>
-              <a:rPr lang="en-US" sz="2000" dirty="0"/>
-              <a:t>what</a:t>
-            </a:r>
-            <a:r>
-              <a:rPr lang="fr-FR" sz="2000" dirty="0"/>
-              <a:t> are the </a:t>
-            </a:r>
-            <a:r>
-              <a:rPr lang="en-US" sz="2000" dirty="0"/>
-              <a:t>wireless</a:t>
-            </a:r>
-            <a:r>
-              <a:rPr lang="fr-FR" sz="2000" dirty="0"/>
-              <a:t> connections </a:t>
-            </a:r>
-            <a:r>
-              <a:rPr lang="en-US" sz="2000" dirty="0"/>
-              <a:t>issues during runtime (e.g. in the worst case, a given Vive Tracker device can be disconnected and connected again </a:t>
-            </a:r>
-            <a:r>
-              <a:rPr lang="fr-FR" sz="2000" dirty="0"/>
-              <a:t>multiple times).</a:t>
-            </a:r>
-          </a:p>
-          <a:p>
-            <a:pPr algn="just">
-              <a:spcBef>
-                <a:spcPts val="0"/>
-              </a:spcBef>
-            </a:pPr>
-            <a:endParaRPr lang="fr-FR" sz="2000" dirty="0"/>
-          </a:p>
-          <a:p>
-            <a:pPr algn="just">
-              <a:spcBef>
-                <a:spcPts val="0"/>
-              </a:spcBef>
-            </a:pPr>
-            <a:r>
-              <a:rPr lang="fr-FR" sz="2000" dirty="0"/>
-              <a:t>To </a:t>
-            </a:r>
-            <a:r>
-              <a:rPr lang="en-US" sz="2000" dirty="0"/>
-              <a:t>guarantee a consistent identification of Vive Tracker devices and no duplicates of the corresponding Vive Tracker virtual objects, we use </a:t>
-            </a:r>
-            <a:r>
-              <a:rPr lang="fr-FR" sz="2000" dirty="0"/>
-              <a:t>a configuration file (</a:t>
-            </a:r>
-            <a:r>
-              <a:rPr lang="en-US" sz="2000" dirty="0"/>
-              <a:t>see</a:t>
-            </a:r>
-            <a:r>
-              <a:rPr lang="fr-FR" sz="2000" dirty="0"/>
-              <a:t> </a:t>
-            </a:r>
-            <a:r>
-              <a:rPr lang="fr-FR" sz="2000" b="1" dirty="0"/>
-              <a:t>ViveTrackers.csv</a:t>
-            </a:r>
-            <a:r>
-              <a:rPr lang="fr-FR" sz="2000" dirty="0"/>
-              <a:t>) </a:t>
-            </a:r>
-            <a:r>
-              <a:rPr lang="en-US" sz="2000" dirty="0"/>
-              <a:t>which allows you to define the association between </a:t>
-            </a:r>
-            <a:r>
-              <a:rPr lang="fr-FR" sz="2000" dirty="0"/>
-              <a:t>a Vive Tracker </a:t>
-            </a:r>
-            <a:r>
-              <a:rPr lang="en-US" sz="2000" dirty="0"/>
-              <a:t>device (using its </a:t>
-            </a:r>
-            <a:r>
-              <a:rPr lang="en-US" sz="2000" b="1" dirty="0"/>
-              <a:t>unique serial number</a:t>
-            </a:r>
-            <a:r>
-              <a:rPr lang="en-US" sz="2000" dirty="0"/>
-              <a:t>) </a:t>
-            </a:r>
-            <a:r>
-              <a:rPr lang="fr-FR" sz="2000" dirty="0"/>
-              <a:t>and a </a:t>
-            </a:r>
-            <a:r>
-              <a:rPr lang="fr-FR" sz="2000" b="1" dirty="0"/>
-              <a:t>unique </a:t>
-            </a:r>
-            <a:r>
-              <a:rPr lang="en-US" sz="2000" b="1" dirty="0"/>
-              <a:t>label </a:t>
-            </a:r>
-            <a:r>
-              <a:rPr lang="en-US" sz="2000" dirty="0"/>
-              <a:t>that you can freely define </a:t>
-            </a:r>
-            <a:r>
-              <a:rPr lang="fr-FR" sz="2000" dirty="0"/>
-              <a:t>(e.g. « A », « B », « C », …).</a:t>
-            </a:r>
-          </a:p>
-          <a:p>
-            <a:pPr algn="just">
-              <a:spcBef>
-                <a:spcPts val="0"/>
-              </a:spcBef>
-            </a:pPr>
-            <a:endParaRPr lang="fr-FR" sz="2000" dirty="0"/>
-          </a:p>
-          <a:p>
-            <a:pPr algn="just">
-              <a:spcBef>
-                <a:spcPts val="0"/>
-              </a:spcBef>
-            </a:pPr>
-            <a:r>
-              <a:rPr lang="en-US" sz="2000" dirty="0"/>
-              <a:t>The </a:t>
-            </a:r>
-            <a:r>
-              <a:rPr lang="en-US" sz="2000" b="1" dirty="0" err="1"/>
-              <a:t>ViveTrackersManager</a:t>
-            </a:r>
-            <a:r>
-              <a:rPr lang="en-US" sz="2000" b="1" dirty="0"/>
-              <a:t> </a:t>
-            </a:r>
-            <a:r>
-              <a:rPr lang="en-US" sz="2000" dirty="0"/>
-              <a:t>script can use this configuration file to always associate a Vive Tracker device with the same unique Vive Tracker virtual object.</a:t>
-            </a:r>
-          </a:p>
-          <a:p>
-            <a:pPr algn="just">
-              <a:spcBef>
-                <a:spcPts val="0"/>
-              </a:spcBef>
-            </a:pPr>
-            <a:endParaRPr lang="en-US" sz="2000" dirty="0"/>
-          </a:p>
-          <a:p>
-            <a:pPr marL="457200" indent="-457200" algn="just">
-              <a:spcBef>
-                <a:spcPts val="0"/>
-              </a:spcBef>
-              <a:spcAft>
-                <a:spcPts val="600"/>
-              </a:spcAft>
-              <a:buFont typeface="+mj-lt"/>
-              <a:buAutoNum type="arabicPeriod"/>
-            </a:pPr>
-            <a:r>
-              <a:rPr lang="en-US" sz="2000" dirty="0"/>
-              <a:t>To build your own configuration file, you first need to: </a:t>
-            </a:r>
-          </a:p>
-          <a:p>
-            <a:pPr marL="800100" lvl="1" indent="-342900" algn="just">
-              <a:spcBef>
-                <a:spcPts val="0"/>
-              </a:spcBef>
-              <a:buFont typeface="Arial" panose="020B0604020202020204" pitchFamily="34" charset="0"/>
-              <a:buChar char="•"/>
-            </a:pPr>
-            <a:r>
-              <a:rPr lang="en-US" sz="1800" dirty="0"/>
-              <a:t>add your Vive Tracker devices’ serial numbers to it : set </a:t>
-            </a:r>
-            <a:r>
-              <a:rPr lang="fr-CH" sz="1800" b="1" dirty="0" err="1"/>
-              <a:t>logTrackersDetection</a:t>
-            </a:r>
-            <a:r>
-              <a:rPr lang="fr-CH" sz="1800" b="1" dirty="0"/>
-              <a:t> </a:t>
-            </a:r>
-            <a:r>
-              <a:rPr lang="fr-CH" sz="1800" dirty="0" err="1"/>
-              <a:t>field</a:t>
-            </a:r>
-            <a:r>
-              <a:rPr lang="fr-CH" sz="1800" dirty="0"/>
-              <a:t> to </a:t>
-            </a:r>
-            <a:r>
-              <a:rPr lang="fr-CH" sz="1800" b="1" dirty="0" err="1"/>
-              <a:t>true</a:t>
-            </a:r>
-            <a:endParaRPr lang="fr-CH" sz="1800" b="1" dirty="0"/>
-          </a:p>
-          <a:p>
-            <a:pPr marL="800100" lvl="1" indent="-342900" algn="just">
-              <a:spcBef>
-                <a:spcPts val="0"/>
-              </a:spcBef>
-              <a:spcAft>
-                <a:spcPts val="600"/>
-              </a:spcAft>
-              <a:buFont typeface="Arial" panose="020B0604020202020204" pitchFamily="34" charset="0"/>
-              <a:buChar char="•"/>
-            </a:pPr>
-            <a:r>
-              <a:rPr lang="en-US" sz="1800" dirty="0"/>
-              <a:t>allow</a:t>
-            </a:r>
-            <a:r>
-              <a:rPr lang="fr-CH" sz="1800" dirty="0"/>
-              <a:t> the use of all </a:t>
-            </a:r>
-            <a:r>
-              <a:rPr lang="en-US" sz="1800" dirty="0"/>
-              <a:t>available</a:t>
-            </a:r>
-            <a:r>
-              <a:rPr lang="fr-CH" sz="1800" dirty="0"/>
-              <a:t> </a:t>
-            </a:r>
-            <a:r>
-              <a:rPr lang="en-US" sz="1800" dirty="0"/>
-              <a:t>connected</a:t>
-            </a:r>
-            <a:r>
-              <a:rPr lang="fr-CH" sz="1800" dirty="0"/>
-              <a:t> </a:t>
-            </a:r>
-            <a:r>
-              <a:rPr lang="en-US" sz="1800" dirty="0"/>
-              <a:t>devices</a:t>
-            </a:r>
-            <a:r>
-              <a:rPr lang="fr-CH" sz="1800" dirty="0"/>
-              <a:t> in </a:t>
-            </a:r>
-            <a:r>
-              <a:rPr lang="fr-CH" sz="1800" dirty="0" err="1"/>
-              <a:t>SteamVR</a:t>
-            </a:r>
-            <a:r>
-              <a:rPr lang="fr-CH" sz="1800" dirty="0"/>
-              <a:t> : </a:t>
-            </a:r>
-            <a:r>
-              <a:rPr lang="en-US" sz="1800" dirty="0"/>
-              <a:t>set </a:t>
-            </a:r>
-            <a:r>
-              <a:rPr lang="fr-CH" sz="1800" b="1" dirty="0" err="1"/>
-              <a:t>createDeclaredTrackersOnly</a:t>
-            </a:r>
-            <a:r>
-              <a:rPr lang="fr-CH" sz="1800" b="1" dirty="0"/>
-              <a:t> </a:t>
-            </a:r>
-            <a:r>
-              <a:rPr lang="fr-CH" sz="1800" dirty="0" err="1"/>
-              <a:t>field</a:t>
-            </a:r>
-            <a:r>
-              <a:rPr lang="fr-CH" sz="1800" dirty="0"/>
-              <a:t> to </a:t>
-            </a:r>
-            <a:r>
-              <a:rPr lang="fr-CH" sz="1800" b="1" dirty="0"/>
-              <a:t>false</a:t>
-            </a:r>
-            <a:endParaRPr lang="fr-CH" sz="1800" dirty="0"/>
-          </a:p>
-          <a:p>
-            <a:pPr algn="just">
-              <a:spcBef>
-                <a:spcPts val="0"/>
-              </a:spcBef>
-            </a:pPr>
-            <a:r>
-              <a:rPr lang="en-US" sz="2000" dirty="0"/>
-              <a:t>This way, all the connected Vive Tracker devices will get their serial numbers printed in the Unity3D Console, and you can just copy these serial numbers to fill your own configuration file.</a:t>
-            </a:r>
-          </a:p>
-          <a:p>
-            <a:pPr algn="just">
-              <a:spcBef>
-                <a:spcPts val="0"/>
-              </a:spcBef>
-            </a:pPr>
-            <a:endParaRPr lang="fr-CH" sz="2000" dirty="0"/>
-          </a:p>
-          <a:p>
-            <a:pPr marL="457200" indent="-457200" algn="just">
-              <a:spcBef>
-                <a:spcPts val="0"/>
-              </a:spcBef>
-              <a:spcAft>
-                <a:spcPts val="600"/>
-              </a:spcAft>
-              <a:buFont typeface="+mj-lt"/>
-              <a:buAutoNum type="arabicPeriod" startAt="2"/>
-            </a:pPr>
-            <a:r>
-              <a:rPr lang="en-US" sz="2000" dirty="0"/>
-              <a:t>Once your configuration file is built, you can use it by:</a:t>
-            </a:r>
-          </a:p>
-          <a:p>
-            <a:pPr marL="800100" lvl="1" indent="-342900" algn="just">
-              <a:spcBef>
-                <a:spcPts val="0"/>
-              </a:spcBef>
-              <a:buFont typeface="Arial" panose="020B0604020202020204" pitchFamily="34" charset="0"/>
-              <a:buChar char="•"/>
-            </a:pPr>
-            <a:r>
-              <a:rPr lang="en-US" sz="1800" dirty="0"/>
-              <a:t>setting your configuration file path </a:t>
-            </a:r>
-            <a:r>
-              <a:rPr lang="fr-FR" sz="1800" dirty="0"/>
-              <a:t>: set </a:t>
-            </a:r>
-            <a:r>
-              <a:rPr lang="en-US" sz="1800" b="1" dirty="0" err="1"/>
-              <a:t>configFilePath</a:t>
-            </a:r>
-            <a:r>
-              <a:rPr lang="en-US" sz="1800" b="1" dirty="0"/>
-              <a:t> </a:t>
-            </a:r>
-            <a:r>
-              <a:rPr lang="en-US" sz="1800" dirty="0"/>
-              <a:t>field</a:t>
-            </a:r>
-          </a:p>
-          <a:p>
-            <a:pPr marL="800100" lvl="1" indent="-342900" algn="just">
-              <a:spcBef>
-                <a:spcPts val="0"/>
-              </a:spcBef>
-              <a:buFont typeface="Arial" panose="020B0604020202020204" pitchFamily="34" charset="0"/>
-              <a:buChar char="•"/>
-            </a:pPr>
-            <a:r>
-              <a:rPr lang="en-US" sz="1800" dirty="0"/>
-              <a:t>enabling the automatic association defined in your configuration file : set </a:t>
-            </a:r>
-            <a:r>
-              <a:rPr lang="fr-CH" sz="1800" b="1" dirty="0" err="1"/>
-              <a:t>createDeclaredTrackersOnly</a:t>
-            </a:r>
-            <a:r>
-              <a:rPr lang="fr-CH" sz="1800" b="1" dirty="0"/>
-              <a:t> </a:t>
-            </a:r>
-            <a:r>
-              <a:rPr lang="fr-CH" sz="1800" dirty="0" err="1"/>
-              <a:t>field</a:t>
-            </a:r>
-            <a:r>
-              <a:rPr lang="fr-CH" sz="1800" dirty="0"/>
-              <a:t> to </a:t>
-            </a:r>
-            <a:r>
-              <a:rPr lang="fr-CH" sz="1800" b="1" dirty="0" err="1"/>
-              <a:t>true</a:t>
-            </a:r>
-            <a:endParaRPr lang="en-US" sz="1600" b="1" dirty="0"/>
-          </a:p>
-          <a:p>
-            <a:pPr algn="l">
-              <a:spcBef>
-                <a:spcPts val="0"/>
-              </a:spcBef>
-            </a:pPr>
-            <a:endParaRPr lang="en-US" sz="1800" dirty="0"/>
-          </a:p>
-        </p:txBody>
-      </p:sp>
-      <p:sp>
-        <p:nvSpPr>
-          <p:cNvPr id="9" name="ZoneTexte 8">
-            <a:extLst>
-              <a:ext uri="{FF2B5EF4-FFF2-40B4-BE49-F238E27FC236}">
-                <a16:creationId xmlns:a16="http://schemas.microsoft.com/office/drawing/2014/main" id="{A8F73200-0D48-40B9-A830-75FFA3A459EB}"/>
-              </a:ext>
-            </a:extLst>
-          </p:cNvPr>
-          <p:cNvSpPr txBox="1"/>
-          <p:nvPr/>
-        </p:nvSpPr>
-        <p:spPr>
-          <a:xfrm>
-            <a:off x="0" y="0"/>
-            <a:ext cx="12192000" cy="523220"/>
-          </a:xfrm>
-          <a:prstGeom prst="rect">
-            <a:avLst/>
-          </a:prstGeom>
-          <a:noFill/>
-        </p:spPr>
-        <p:txBody>
-          <a:bodyPr wrap="square" rtlCol="0">
-            <a:spAutoFit/>
-          </a:bodyPr>
-          <a:lstStyle/>
-          <a:p>
-            <a:r>
-              <a:rPr lang="en-US" sz="2800" dirty="0"/>
-              <a:t>Keep Vive Trackers identification consistent during runtime</a:t>
-            </a:r>
-          </a:p>
-        </p:txBody>
-      </p:sp>
-    </p:spTree>
-    <p:extLst>
-      <p:ext uri="{BB962C8B-B14F-4D97-AF65-F5344CB8AC3E}">
-        <p14:creationId xmlns:p14="http://schemas.microsoft.com/office/powerpoint/2010/main" val="1496284599"/>
-      </p:ext>
-    </p:extLst>
-  </p:cSld>
-  <p:clrMapOvr>
-    <a:masterClrMapping/>
-  </p:clrMapOvr>
-</p:sld>
-</file>
-
 <file path=ppt/slides/slide4.xml><?xml version="1.0" encoding="utf-8"?>
 <p:sld xmlns:a="http://schemas.openxmlformats.org/drawingml/2006/main" xmlns:r="http://schemas.openxmlformats.org/officeDocument/2006/relationships" xmlns:p="http://schemas.openxmlformats.org/presentationml/2006/main">
   <p:cSld>
@@ -5073,7 +5092,7 @@
               <p:nvPr/>
             </p:nvPicPr>
             <p:blipFill>
-              <a:blip r:embed="rId4">
+              <a:blip r:embed="rId4" cstate="hqprint">
                 <a:extLst>
                   <a:ext uri="{28A0092B-C50C-407E-A947-70E740481C1C}">
                     <a14:useLocalDpi xmlns:a14="http://schemas.microsoft.com/office/drawing/2010/main" val="0"/>
@@ -5220,16 +5239,24 @@
           <a:lstStyle/>
           <a:p>
             <a:r>
+              <a:rPr lang="en-US" sz="2800" dirty="0" err="1" smtClean="0"/>
+              <a:t>SteamVR</a:t>
+            </a:r>
+            <a:r>
+              <a:rPr lang="en-US" sz="2800" dirty="0" smtClean="0"/>
+              <a:t> </a:t>
+            </a:r>
+            <a:r>
               <a:rPr lang="en-US" sz="2800" dirty="0"/>
-              <a:t>Understanding </a:t>
-            </a:r>
-            <a:r>
-              <a:rPr lang="en-US" sz="2800" dirty="0" err="1"/>
-              <a:t>SteamVR</a:t>
+              <a:t>Room calibration </a:t>
+            </a:r>
+            <a:r>
+              <a:rPr lang="en-US" sz="2800" dirty="0" smtClean="0"/>
+              <a:t>Vs </a:t>
             </a:r>
             <a:r>
               <a:rPr lang="en-US" sz="2800" dirty="0"/>
-              <a:t> Room calibration and Vive Trackers calibration</a:t>
+              <a:t>Vive Trackers calibration</a:t>
             </a:r>
           </a:p>
         </p:txBody>
@@ -5421,10 +5448,10 @@
       </p:grpSpPr>
       <p:sp>
         <p:nvSpPr>
-          <p:cNvPr id="2" name="Titre 1">
-            <a:extLst>
-              <a:ext uri="{FF2B5EF4-FFF2-40B4-BE49-F238E27FC236}">
-                <a16:creationId xmlns:a16="http://schemas.microsoft.com/office/drawing/2014/main" id="{CD27C932-A795-4BDA-8F0E-5A1627F64C61}"/>
+          <p:cNvPr id="3" name="Sous-titre 2">
+            <a:extLst>
+              <a:ext uri="{FF2B5EF4-FFF2-40B4-BE49-F238E27FC236}">
+                <a16:creationId xmlns:a16="http://schemas.microsoft.com/office/drawing/2014/main" id="{EBB0C4BD-6D46-496F-9459-88A9D2FA1908}"/>
               </a:ext>
             </a:extLst>
           </p:cNvPr>
@@ -5432,26 +5459,575 @@
             <a:spLocks noGrp="1"/>
           </p:cNvSpPr>
           <p:nvPr>
-            <p:ph type="ctrTitle"/>
+            <p:ph type="subTitle" idx="1"/>
           </p:nvPr>
         </p:nvSpPr>
         <p:spPr>
           <a:xfrm>
-            <a:off x="1192530" y="2235200"/>
-            <a:ext cx="9806940" cy="2387600"/>
+            <a:off x="0" y="745436"/>
+            <a:ext cx="12192000" cy="5993294"/>
           </a:xfrm>
         </p:spPr>
         <p:txBody>
-          <a:bodyPr anchor="ctr"/>
-          <a:lstStyle/>
-          <a:p>
-            <a:r>
-              <a:rPr lang="fr-FR" dirty="0" err="1"/>
+          <a:bodyPr>
+            <a:normAutofit lnSpcReduction="10000"/>
+          </a:bodyPr>
+          <a:lstStyle/>
+          <a:p>
+            <a:pPr algn="just">
+              <a:spcBef>
+                <a:spcPts val="0"/>
+              </a:spcBef>
+            </a:pPr>
+            <a:r>
+              <a:rPr lang="en-US" sz="2000" dirty="0"/>
+              <a:t>When</a:t>
+            </a:r>
+            <a:r>
+              <a:rPr lang="fr-FR" sz="2000" dirty="0"/>
+              <a:t> </a:t>
+            </a:r>
+            <a:r>
+              <a:rPr lang="en-US" sz="2000" dirty="0"/>
+              <a:t>using</a:t>
+            </a:r>
+            <a:r>
+              <a:rPr lang="fr-FR" sz="2000" dirty="0"/>
+              <a:t> Vive Trackers, one </a:t>
+            </a:r>
+            <a:r>
+              <a:rPr lang="en-US" sz="2000" dirty="0"/>
+              <a:t>problem</a:t>
+            </a:r>
+            <a:r>
+              <a:rPr lang="fr-FR" sz="2000" dirty="0"/>
+              <a:t> </a:t>
+            </a:r>
+            <a:r>
+              <a:rPr lang="en-US" sz="2000" dirty="0"/>
+              <a:t>is</a:t>
+            </a:r>
+            <a:r>
+              <a:rPr lang="fr-FR" sz="2000" dirty="0"/>
+              <a:t> to </a:t>
+            </a:r>
+            <a:r>
+              <a:rPr lang="en-US" sz="2000" dirty="0"/>
+              <a:t>guarantee</a:t>
+            </a:r>
+            <a:r>
+              <a:rPr lang="fr-FR" sz="2000" dirty="0"/>
+              <a:t> </a:t>
+            </a:r>
+            <a:r>
+              <a:rPr lang="en-US" sz="2000" dirty="0"/>
+              <a:t>that</a:t>
+            </a:r>
+            <a:r>
+              <a:rPr lang="fr-FR" sz="2000" dirty="0"/>
+              <a:t> a </a:t>
+            </a:r>
+            <a:r>
+              <a:rPr lang="en-US" sz="2000" dirty="0"/>
+              <a:t>given</a:t>
+            </a:r>
+            <a:r>
+              <a:rPr lang="fr-FR" sz="2000" dirty="0"/>
+              <a:t> </a:t>
+            </a:r>
+            <a:r>
+              <a:rPr lang="fr-FR" sz="2000" b="1" dirty="0"/>
+              <a:t>Vive Tracker </a:t>
+            </a:r>
+            <a:r>
+              <a:rPr lang="en-US" sz="2000" b="1" dirty="0"/>
+              <a:t>device</a:t>
+            </a:r>
+            <a:r>
+              <a:rPr lang="fr-FR" sz="2000" dirty="0"/>
+              <a:t> </a:t>
+            </a:r>
+            <a:r>
+              <a:rPr lang="en-US" sz="2000" dirty="0"/>
+              <a:t>is</a:t>
+            </a:r>
+            <a:r>
+              <a:rPr lang="fr-FR" sz="2000" dirty="0"/>
+              <a:t> </a:t>
+            </a:r>
+            <a:r>
+              <a:rPr lang="en-US" sz="2000" dirty="0"/>
+              <a:t>always</a:t>
+            </a:r>
+            <a:r>
+              <a:rPr lang="fr-FR" sz="2000" dirty="0"/>
+              <a:t> </a:t>
+            </a:r>
+            <a:r>
+              <a:rPr lang="en-US" sz="2000" dirty="0"/>
+              <a:t>associated</a:t>
+            </a:r>
+            <a:r>
+              <a:rPr lang="fr-FR" sz="2000" dirty="0"/>
+              <a:t> to the </a:t>
+            </a:r>
+            <a:r>
+              <a:rPr lang="en-US" sz="2000" dirty="0"/>
+              <a:t>same</a:t>
+            </a:r>
+            <a:r>
+              <a:rPr lang="fr-FR" sz="2000" dirty="0"/>
+              <a:t> </a:t>
+            </a:r>
+            <a:r>
+              <a:rPr lang="en-US" sz="2000" b="1" dirty="0"/>
+              <a:t>Vive Tracker virtual object</a:t>
+            </a:r>
+            <a:r>
+              <a:rPr lang="en-US" sz="2000" dirty="0"/>
+              <a:t> (e.g. a </a:t>
+            </a:r>
+            <a:r>
+              <a:rPr lang="en-US" sz="2000" dirty="0" err="1"/>
+              <a:t>GameObject</a:t>
+            </a:r>
+            <a:r>
+              <a:rPr lang="en-US" sz="2000" dirty="0"/>
+              <a:t> with a </a:t>
+            </a:r>
+            <a:r>
+              <a:rPr lang="en-US" sz="2000" b="1" dirty="0" err="1"/>
+              <a:t>ViveTracker</a:t>
+            </a:r>
+            <a:r>
+              <a:rPr lang="en-US" sz="2000" dirty="0"/>
+              <a:t> script on it), </a:t>
+            </a:r>
+            <a:r>
+              <a:rPr lang="fr-FR" sz="2000" dirty="0"/>
+              <a:t>no </a:t>
+            </a:r>
+            <a:r>
+              <a:rPr lang="en-US" sz="2000" dirty="0"/>
+              <a:t>matter</a:t>
+            </a:r>
+            <a:r>
+              <a:rPr lang="fr-FR" sz="2000" dirty="0"/>
+              <a:t> </a:t>
+            </a:r>
+            <a:r>
+              <a:rPr lang="en-US" sz="2000" dirty="0"/>
+              <a:t>what</a:t>
+            </a:r>
+            <a:r>
+              <a:rPr lang="fr-FR" sz="2000" dirty="0"/>
+              <a:t> are the </a:t>
+            </a:r>
+            <a:r>
+              <a:rPr lang="en-US" sz="2000" dirty="0"/>
+              <a:t>wireless</a:t>
+            </a:r>
+            <a:r>
+              <a:rPr lang="fr-FR" sz="2000" dirty="0"/>
+              <a:t> connections </a:t>
+            </a:r>
+            <a:r>
+              <a:rPr lang="en-US" sz="2000" dirty="0"/>
+              <a:t>issues during runtime (e.g. in the worst case, a given Vive Tracker device can be disconnected and connected again </a:t>
+            </a:r>
+            <a:r>
+              <a:rPr lang="fr-FR" sz="2000" dirty="0"/>
+              <a:t>multiple times).</a:t>
+            </a:r>
+          </a:p>
+          <a:p>
+            <a:pPr algn="just">
+              <a:spcBef>
+                <a:spcPts val="0"/>
+              </a:spcBef>
+            </a:pPr>
+            <a:endParaRPr lang="fr-FR" sz="2000" dirty="0"/>
+          </a:p>
+          <a:p>
+            <a:pPr algn="just">
+              <a:spcBef>
+                <a:spcPts val="0"/>
+              </a:spcBef>
+            </a:pPr>
+            <a:r>
+              <a:rPr lang="fr-FR" sz="2000" dirty="0"/>
+              <a:t>To </a:t>
+            </a:r>
+            <a:r>
+              <a:rPr lang="en-US" sz="2000" dirty="0"/>
+              <a:t>guarantee a consistent identification of Vive Tracker devices and no duplicates of the corresponding Vive Tracker virtual objects, we use </a:t>
+            </a:r>
+            <a:r>
+              <a:rPr lang="fr-FR" sz="2000" dirty="0"/>
+              <a:t>a configuration file (</a:t>
+            </a:r>
+            <a:r>
+              <a:rPr lang="en-US" sz="2000" dirty="0"/>
+              <a:t>see</a:t>
+            </a:r>
+            <a:r>
+              <a:rPr lang="fr-FR" sz="2000" dirty="0"/>
+              <a:t> </a:t>
+            </a:r>
+            <a:r>
+              <a:rPr lang="fr-FR" sz="2000" b="1" dirty="0"/>
+              <a:t>ViveTrackers.csv</a:t>
+            </a:r>
+            <a:r>
+              <a:rPr lang="fr-FR" sz="2000" dirty="0"/>
+              <a:t>) </a:t>
+            </a:r>
+            <a:r>
+              <a:rPr lang="en-US" sz="2000" dirty="0"/>
+              <a:t>which allows you to define the association between </a:t>
+            </a:r>
+            <a:r>
+              <a:rPr lang="fr-FR" sz="2000" dirty="0"/>
+              <a:t>a Vive Tracker </a:t>
+            </a:r>
+            <a:r>
+              <a:rPr lang="en-US" sz="2000" dirty="0"/>
+              <a:t>device (using its </a:t>
+            </a:r>
+            <a:r>
+              <a:rPr lang="en-US" sz="2000" b="1" dirty="0"/>
+              <a:t>unique serial number</a:t>
+            </a:r>
+            <a:r>
+              <a:rPr lang="en-US" sz="2000" dirty="0"/>
+              <a:t>) </a:t>
+            </a:r>
+            <a:r>
+              <a:rPr lang="fr-FR" sz="2000" dirty="0"/>
+              <a:t>and a </a:t>
+            </a:r>
+            <a:r>
+              <a:rPr lang="fr-FR" sz="2000" b="1" dirty="0"/>
+              <a:t>unique </a:t>
+            </a:r>
+            <a:r>
+              <a:rPr lang="en-US" sz="2000" b="1" dirty="0"/>
+              <a:t>label </a:t>
+            </a:r>
+            <a:r>
+              <a:rPr lang="en-US" sz="2000" dirty="0"/>
+              <a:t>that you can freely define </a:t>
+            </a:r>
+            <a:r>
+              <a:rPr lang="fr-FR" sz="2000" dirty="0"/>
+              <a:t>(e.g. « A », « B », « C », …).</a:t>
+            </a:r>
+          </a:p>
+          <a:p>
+            <a:pPr algn="just">
+              <a:spcBef>
+                <a:spcPts val="0"/>
+              </a:spcBef>
+            </a:pPr>
+            <a:endParaRPr lang="fr-FR" sz="2000" dirty="0"/>
+          </a:p>
+          <a:p>
+            <a:pPr algn="just">
+              <a:spcBef>
+                <a:spcPts val="0"/>
+              </a:spcBef>
+            </a:pPr>
+            <a:r>
+              <a:rPr lang="en-US" sz="2000" dirty="0"/>
+              <a:t>The </a:t>
+            </a:r>
+            <a:r>
+              <a:rPr lang="en-US" sz="2000" b="1" dirty="0" err="1"/>
+              <a:t>ViveTrackersManager</a:t>
+            </a:r>
+            <a:r>
+              <a:rPr lang="en-US" sz="2000" b="1" dirty="0"/>
+              <a:t> </a:t>
+            </a:r>
+            <a:r>
+              <a:rPr lang="en-US" sz="2000" dirty="0"/>
+              <a:t>script can use this configuration file to always associate a Vive Tracker device with the same unique Vive Tracker virtual object.</a:t>
+            </a:r>
+          </a:p>
+          <a:p>
+            <a:pPr algn="just">
+              <a:spcBef>
+                <a:spcPts val="0"/>
+              </a:spcBef>
+            </a:pPr>
+            <a:endParaRPr lang="en-US" sz="2000" dirty="0"/>
+          </a:p>
+          <a:p>
+            <a:pPr marL="457200" indent="-457200" algn="just">
+              <a:spcBef>
+                <a:spcPts val="0"/>
+              </a:spcBef>
+              <a:spcAft>
+                <a:spcPts val="600"/>
+              </a:spcAft>
+              <a:buFont typeface="+mj-lt"/>
+              <a:buAutoNum type="arabicPeriod"/>
+            </a:pPr>
+            <a:r>
+              <a:rPr lang="en-US" sz="2000" dirty="0"/>
+              <a:t>To build your own configuration file, you first need to: </a:t>
+            </a:r>
+          </a:p>
+          <a:p>
+            <a:pPr marL="800100" lvl="1" indent="-342900" algn="just">
+              <a:spcBef>
+                <a:spcPts val="0"/>
+              </a:spcBef>
+              <a:buFont typeface="Arial" panose="020B0604020202020204" pitchFamily="34" charset="0"/>
+              <a:buChar char="•"/>
+            </a:pPr>
+            <a:r>
+              <a:rPr lang="en-US" sz="1800" dirty="0"/>
+              <a:t>add your Vive Tracker devices’ serial numbers to it : set </a:t>
+            </a:r>
+            <a:r>
+              <a:rPr lang="fr-CH" sz="1800" b="1" dirty="0" err="1"/>
+              <a:t>logTrackersDetection</a:t>
+            </a:r>
+            <a:r>
+              <a:rPr lang="fr-CH" sz="1800" b="1" dirty="0"/>
+              <a:t> </a:t>
+            </a:r>
+            <a:r>
+              <a:rPr lang="fr-CH" sz="1800" dirty="0" err="1"/>
+              <a:t>field</a:t>
+            </a:r>
+            <a:r>
+              <a:rPr lang="fr-CH" sz="1800" dirty="0"/>
+              <a:t> to </a:t>
+            </a:r>
+            <a:r>
+              <a:rPr lang="fr-CH" sz="1800" b="1" dirty="0" err="1"/>
+              <a:t>true</a:t>
+            </a:r>
+            <a:endParaRPr lang="fr-CH" sz="1800" b="1" dirty="0"/>
+          </a:p>
+          <a:p>
+            <a:pPr marL="800100" lvl="1" indent="-342900" algn="just">
+              <a:spcBef>
+                <a:spcPts val="0"/>
+              </a:spcBef>
+              <a:spcAft>
+                <a:spcPts val="600"/>
+              </a:spcAft>
+              <a:buFont typeface="Arial" panose="020B0604020202020204" pitchFamily="34" charset="0"/>
+              <a:buChar char="•"/>
+            </a:pPr>
+            <a:r>
+              <a:rPr lang="en-US" sz="1800" dirty="0"/>
+              <a:t>allow</a:t>
+            </a:r>
+            <a:r>
+              <a:rPr lang="fr-CH" sz="1800" dirty="0"/>
+              <a:t> the use of all </a:t>
+            </a:r>
+            <a:r>
+              <a:rPr lang="en-US" sz="1800" dirty="0"/>
+              <a:t>available</a:t>
+            </a:r>
+            <a:r>
+              <a:rPr lang="fr-CH" sz="1800" dirty="0"/>
+              <a:t> </a:t>
+            </a:r>
+            <a:r>
+              <a:rPr lang="en-US" sz="1800" dirty="0"/>
+              <a:t>connected</a:t>
+            </a:r>
+            <a:r>
+              <a:rPr lang="fr-CH" sz="1800" dirty="0"/>
+              <a:t> </a:t>
+            </a:r>
+            <a:r>
+              <a:rPr lang="en-US" sz="1800" dirty="0"/>
+              <a:t>devices</a:t>
+            </a:r>
+            <a:r>
+              <a:rPr lang="fr-CH" sz="1800" dirty="0"/>
+              <a:t> in </a:t>
+            </a:r>
+            <a:r>
+              <a:rPr lang="fr-CH" sz="1800" dirty="0" err="1"/>
               <a:t>SteamVR</a:t>
             </a:r>
             <a:r>
-              <a:rPr lang="fr-FR" dirty="0"/>
-              <a:t> configuration</a:t>
+              <a:rPr lang="fr-CH" sz="1800" dirty="0"/>
+              <a:t> : </a:t>
+            </a:r>
+            <a:r>
+              <a:rPr lang="en-US" sz="1800" dirty="0"/>
+              <a:t>set </a:t>
+            </a:r>
+            <a:r>
+              <a:rPr lang="fr-CH" sz="1800" b="1" dirty="0" err="1"/>
+              <a:t>createDeclaredTrackersOnly</a:t>
+            </a:r>
+            <a:r>
+              <a:rPr lang="fr-CH" sz="1800" b="1" dirty="0"/>
+              <a:t> </a:t>
+            </a:r>
+            <a:r>
+              <a:rPr lang="fr-CH" sz="1800" dirty="0" err="1"/>
+              <a:t>field</a:t>
+            </a:r>
+            <a:r>
+              <a:rPr lang="fr-CH" sz="1800" dirty="0"/>
+              <a:t> to </a:t>
+            </a:r>
+            <a:r>
+              <a:rPr lang="fr-CH" sz="1800" b="1" dirty="0"/>
+              <a:t>false</a:t>
+            </a:r>
+            <a:endParaRPr lang="fr-CH" sz="1800" dirty="0"/>
+          </a:p>
+          <a:p>
+            <a:pPr algn="just">
+              <a:spcBef>
+                <a:spcPts val="0"/>
+              </a:spcBef>
+            </a:pPr>
+            <a:r>
+              <a:rPr lang="en-US" sz="2000" dirty="0"/>
+              <a:t>This way, all the connected Vive Tracker devices will get their serial numbers printed in the Unity3D Console, and you can just copy these serial numbers to fill your own configuration file.</a:t>
+            </a:r>
+          </a:p>
+          <a:p>
+            <a:pPr algn="just">
+              <a:spcBef>
+                <a:spcPts val="0"/>
+              </a:spcBef>
+            </a:pPr>
+            <a:endParaRPr lang="fr-CH" sz="2000" dirty="0"/>
+          </a:p>
+          <a:p>
+            <a:pPr marL="457200" indent="-457200" algn="just">
+              <a:spcBef>
+                <a:spcPts val="0"/>
+              </a:spcBef>
+              <a:spcAft>
+                <a:spcPts val="600"/>
+              </a:spcAft>
+              <a:buFont typeface="+mj-lt"/>
+              <a:buAutoNum type="arabicPeriod" startAt="2"/>
+            </a:pPr>
+            <a:r>
+              <a:rPr lang="en-US" sz="2000" dirty="0"/>
+              <a:t>Once your configuration file is built, you can use it by:</a:t>
+            </a:r>
+          </a:p>
+          <a:p>
+            <a:pPr marL="800100" lvl="1" indent="-342900" algn="just">
+              <a:spcBef>
+                <a:spcPts val="0"/>
+              </a:spcBef>
+              <a:buFont typeface="Arial" panose="020B0604020202020204" pitchFamily="34" charset="0"/>
+              <a:buChar char="•"/>
+            </a:pPr>
+            <a:r>
+              <a:rPr lang="en-US" sz="1800" dirty="0"/>
+              <a:t>setting your configuration file path </a:t>
+            </a:r>
+            <a:r>
+              <a:rPr lang="fr-FR" sz="1800" dirty="0"/>
+              <a:t>: set </a:t>
+            </a:r>
+            <a:r>
+              <a:rPr lang="en-US" sz="1800" b="1" dirty="0" err="1"/>
+              <a:t>configFilePath</a:t>
+            </a:r>
+            <a:r>
+              <a:rPr lang="en-US" sz="1800" b="1" dirty="0"/>
+              <a:t> </a:t>
+            </a:r>
+            <a:r>
+              <a:rPr lang="en-US" sz="1800" dirty="0"/>
+              <a:t>field</a:t>
+            </a:r>
+          </a:p>
+          <a:p>
+            <a:pPr marL="800100" lvl="1" indent="-342900" algn="just">
+              <a:spcBef>
+                <a:spcPts val="0"/>
+              </a:spcBef>
+              <a:buFont typeface="Arial" panose="020B0604020202020204" pitchFamily="34" charset="0"/>
+              <a:buChar char="•"/>
+            </a:pPr>
+            <a:r>
+              <a:rPr lang="en-US" sz="1800" dirty="0"/>
+              <a:t>enabling the automatic association defined in your configuration file : set </a:t>
+            </a:r>
+            <a:r>
+              <a:rPr lang="fr-CH" sz="1800" b="1" dirty="0" err="1"/>
+              <a:t>createDeclaredTrackersOnly</a:t>
+            </a:r>
+            <a:r>
+              <a:rPr lang="fr-CH" sz="1800" b="1" dirty="0"/>
+              <a:t> </a:t>
+            </a:r>
+            <a:r>
+              <a:rPr lang="fr-CH" sz="1800" dirty="0" err="1"/>
+              <a:t>field</a:t>
+            </a:r>
+            <a:r>
+              <a:rPr lang="fr-CH" sz="1800" dirty="0"/>
+              <a:t> to </a:t>
+            </a:r>
+            <a:r>
+              <a:rPr lang="fr-CH" sz="1800" b="1" dirty="0" err="1"/>
+              <a:t>true</a:t>
+            </a:r>
+            <a:endParaRPr lang="en-US" sz="1600" b="1" dirty="0"/>
+          </a:p>
+          <a:p>
+            <a:pPr algn="l">
+              <a:spcBef>
+                <a:spcPts val="0"/>
+              </a:spcBef>
+            </a:pPr>
+            <a:endParaRPr lang="en-US" sz="1800" dirty="0"/>
+          </a:p>
+        </p:txBody>
+      </p:sp>
+      <p:sp>
+        <p:nvSpPr>
+          <p:cNvPr id="9" name="ZoneTexte 8">
+            <a:extLst>
+              <a:ext uri="{FF2B5EF4-FFF2-40B4-BE49-F238E27FC236}">
+                <a16:creationId xmlns:a16="http://schemas.microsoft.com/office/drawing/2014/main" id="{A8F73200-0D48-40B9-A830-75FFA3A459EB}"/>
+              </a:ext>
+            </a:extLst>
+          </p:cNvPr>
+          <p:cNvSpPr txBox="1"/>
+          <p:nvPr/>
+        </p:nvSpPr>
+        <p:spPr>
+          <a:xfrm>
+            <a:off x="0" y="0"/>
+            <a:ext cx="12192000" cy="523220"/>
+          </a:xfrm>
+          <a:prstGeom prst="rect">
+            <a:avLst/>
+          </a:prstGeom>
+          <a:noFill/>
+        </p:spPr>
+        <p:txBody>
+          <a:bodyPr wrap="square" rtlCol="0">
+            <a:spAutoFit/>
+          </a:bodyPr>
+          <a:lstStyle/>
+          <a:p>
+            <a:r>
+              <a:rPr lang="en-US" sz="2800" dirty="0"/>
+              <a:t>Keep Vive Trackers identification consistent during runtime</a:t>
             </a:r>
           </a:p>
         </p:txBody>
@@ -5459,7 +6035,7 @@
     </p:spTree>
     <p:extLst>
       <p:ext uri="{BB962C8B-B14F-4D97-AF65-F5344CB8AC3E}">
-        <p14:creationId xmlns:p14="http://schemas.microsoft.com/office/powerpoint/2010/main" val="3781645063"/>
+        <p14:creationId xmlns:p14="http://schemas.microsoft.com/office/powerpoint/2010/main" val="1496284599"/>
       </p:ext>
     </p:extLst>
   </p:cSld>
@@ -5488,10 +6064,10 @@
       </p:grpSpPr>
       <p:sp>
         <p:nvSpPr>
-          <p:cNvPr id="3" name="Espace réservé du contenu 2">
-            <a:extLst>
-              <a:ext uri="{FF2B5EF4-FFF2-40B4-BE49-F238E27FC236}">
-                <a16:creationId xmlns:a16="http://schemas.microsoft.com/office/drawing/2014/main" id="{867BF634-B408-4057-AB03-965020275BA3}"/>
+          <p:cNvPr id="2" name="Titre 1">
+            <a:extLst>
+              <a:ext uri="{FF2B5EF4-FFF2-40B4-BE49-F238E27FC236}">
+                <a16:creationId xmlns:a16="http://schemas.microsoft.com/office/drawing/2014/main" id="{CD27C932-A795-4BDA-8F0E-5A1627F64C61}"/>
               </a:ext>
             </a:extLst>
           </p:cNvPr>
@@ -5499,324 +6075,39 @@
             <a:spLocks noGrp="1"/>
           </p:cNvSpPr>
           <p:nvPr>
-            <p:ph idx="1"/>
+            <p:ph type="ctrTitle"/>
           </p:nvPr>
         </p:nvSpPr>
         <p:spPr>
           <a:xfrm>
-            <a:off x="0" y="855729"/>
-            <a:ext cx="12192000" cy="5999018"/>
+            <a:off x="1192530" y="2235200"/>
+            <a:ext cx="9806940" cy="2387600"/>
           </a:xfrm>
         </p:spPr>
         <p:txBody>
-          <a:bodyPr>
-            <a:normAutofit/>
-          </a:bodyPr>
-          <a:lstStyle/>
-          <a:p>
-            <a:pPr marL="0" indent="0">
-              <a:buNone/>
-            </a:pPr>
-            <a:r>
-              <a:rPr lang="en-US" sz="2400" dirty="0"/>
-              <a:t>Modify these </a:t>
-            </a:r>
-            <a:r>
-              <a:rPr lang="en-US" sz="2400" dirty="0" err="1"/>
+          <a:bodyPr anchor="ctr"/>
+          <a:lstStyle/>
+          <a:p>
+            <a:r>
+              <a:rPr lang="fr-FR" dirty="0" smtClean="0"/>
+              <a:t>2. </a:t>
+            </a:r>
+            <a:r>
+              <a:rPr lang="fr-FR" dirty="0" err="1"/>
               <a:t>SteamVR</a:t>
             </a:r>
             <a:r>
-              <a:rPr lang="en-US" sz="2400" dirty="0"/>
-              <a:t> configuration files:</a:t>
-            </a:r>
-          </a:p>
-          <a:p>
-            <a:r>
-              <a:rPr lang="en-US" sz="2400" dirty="0" err="1"/>
-              <a:t>SteamFolder</a:t>
-            </a:r>
-            <a:r>
-              <a:rPr lang="fr-FR" sz="2400" dirty="0"/>
-              <a:t>/</a:t>
-            </a:r>
-            <a:r>
-              <a:rPr lang="fr-FR" sz="2400" dirty="0" err="1"/>
-              <a:t>steamapps</a:t>
-            </a:r>
-            <a:r>
-              <a:rPr lang="fr-FR" sz="2400" dirty="0"/>
-              <a:t>/</a:t>
-            </a:r>
-            <a:r>
-              <a:rPr lang="fr-FR" sz="2400" dirty="0" err="1"/>
-              <a:t>common</a:t>
-            </a:r>
-            <a:r>
-              <a:rPr lang="fr-FR" sz="2400" dirty="0"/>
-              <a:t>/</a:t>
-            </a:r>
-            <a:r>
-              <a:rPr lang="fr-FR" sz="2400" dirty="0" err="1"/>
-              <a:t>SteamVR</a:t>
-            </a:r>
-            <a:r>
-              <a:rPr lang="fr-FR" sz="2400" dirty="0"/>
-              <a:t>/drivers/</a:t>
-            </a:r>
-            <a:r>
-              <a:rPr lang="fr-FR" sz="2400" dirty="0" err="1"/>
-              <a:t>null</a:t>
-            </a:r>
-            <a:r>
-              <a:rPr lang="fr-FR" sz="2400" dirty="0"/>
-              <a:t>/</a:t>
-            </a:r>
-            <a:r>
-              <a:rPr lang="fr-FR" sz="2400" dirty="0" err="1"/>
-              <a:t>resources</a:t>
-            </a:r>
-            <a:r>
-              <a:rPr lang="fr-FR" sz="2400" dirty="0"/>
-              <a:t>/settings/</a:t>
-            </a:r>
-            <a:r>
-              <a:rPr lang="fr-FR" sz="2400" dirty="0" err="1"/>
-              <a:t>default.vrsettings</a:t>
-            </a:r>
-            <a:r>
-              <a:rPr lang="en-US" sz="2400" dirty="0"/>
-              <a:t>	</a:t>
-            </a:r>
-          </a:p>
-          <a:p>
-            <a:pPr marL="0" lvl="1" indent="0">
-              <a:spcBef>
-                <a:spcPts val="1000"/>
-              </a:spcBef>
-              <a:buNone/>
-            </a:pPr>
-            <a:r>
-              <a:rPr lang="en-US" dirty="0"/>
-              <a:t>	&gt; set </a:t>
-            </a:r>
-            <a:r>
-              <a:rPr lang="en-US" b="1" dirty="0"/>
-              <a:t>enable</a:t>
-            </a:r>
-            <a:r>
-              <a:rPr lang="en-US" dirty="0"/>
-              <a:t> to </a:t>
-            </a:r>
-            <a:r>
-              <a:rPr lang="en-US" b="1" dirty="0"/>
-              <a:t>true</a:t>
-            </a:r>
-          </a:p>
-          <a:p>
-            <a:r>
-              <a:rPr lang="en-US" sz="2400" dirty="0" err="1"/>
-              <a:t>SteamFolder</a:t>
-            </a:r>
-            <a:r>
-              <a:rPr lang="en-US" sz="2400" dirty="0"/>
-              <a:t>/</a:t>
-            </a:r>
-            <a:r>
-              <a:rPr lang="en-US" sz="2400" dirty="0" err="1"/>
-              <a:t>steamapps</a:t>
-            </a:r>
-            <a:r>
-              <a:rPr lang="en-US" sz="2400" dirty="0"/>
-              <a:t>/common/</a:t>
-            </a:r>
-            <a:r>
-              <a:rPr lang="en-US" sz="2400" dirty="0" err="1"/>
-              <a:t>SteamVR</a:t>
-            </a:r>
-            <a:r>
-              <a:rPr lang="en-US" sz="2400" dirty="0"/>
-              <a:t>/resources/settings/</a:t>
-            </a:r>
-            <a:r>
-              <a:rPr lang="en-US" sz="2400" dirty="0" err="1"/>
-              <a:t>default.vrsettings</a:t>
-            </a:r>
-            <a:endParaRPr lang="fr-FR" sz="2400" dirty="0"/>
-          </a:p>
-          <a:p>
-            <a:pPr marL="0" indent="0">
-              <a:buNone/>
-            </a:pPr>
-            <a:r>
-              <a:rPr lang="fr-FR" sz="2400" dirty="0"/>
-              <a:t>	&gt; set </a:t>
-            </a:r>
-            <a:r>
-              <a:rPr lang="fr-FR" sz="2400" b="1" dirty="0" err="1"/>
-              <a:t>requireHmd</a:t>
-            </a:r>
-            <a:r>
-              <a:rPr lang="fr-FR" sz="2400" b="1" dirty="0"/>
-              <a:t> </a:t>
-            </a:r>
-            <a:r>
-              <a:rPr lang="fr-FR" sz="2400" dirty="0"/>
-              <a:t>to </a:t>
-            </a:r>
-            <a:r>
-              <a:rPr lang="fr-FR" sz="2400" b="1" dirty="0"/>
-              <a:t>false</a:t>
-            </a:r>
-            <a:endParaRPr lang="fr-FR" sz="2400" dirty="0"/>
-          </a:p>
-          <a:p>
-            <a:pPr marL="0" indent="0">
-              <a:buNone/>
-            </a:pPr>
-            <a:r>
-              <a:rPr lang="fr-FR" sz="2400" dirty="0"/>
-              <a:t>	&gt; set </a:t>
-            </a:r>
-            <a:r>
-              <a:rPr lang="fr-FR" sz="2400" b="1" dirty="0" err="1"/>
-              <a:t>forcedDriver</a:t>
-            </a:r>
-            <a:r>
-              <a:rPr lang="fr-FR" sz="2400" dirty="0"/>
-              <a:t> to </a:t>
-            </a:r>
-            <a:r>
-              <a:rPr lang="fr-FR" sz="2400" b="1" dirty="0" err="1"/>
-              <a:t>null</a:t>
-            </a:r>
-            <a:endParaRPr lang="fr-FR" sz="2400" b="1" dirty="0"/>
-          </a:p>
-          <a:p>
-            <a:pPr marL="0" indent="0">
-              <a:buNone/>
-            </a:pPr>
-            <a:r>
-              <a:rPr lang="fr-FR" sz="2400" dirty="0"/>
-              <a:t>	&gt; set </a:t>
-            </a:r>
-            <a:r>
-              <a:rPr lang="fr-FR" sz="2400" b="1" dirty="0" err="1"/>
-              <a:t>activateMultipleDrivers</a:t>
-            </a:r>
-            <a:r>
-              <a:rPr lang="fr-FR" sz="2400" dirty="0"/>
-              <a:t> to </a:t>
-            </a:r>
-            <a:r>
-              <a:rPr lang="fr-FR" sz="2400" b="1" dirty="0" err="1"/>
-              <a:t>true</a:t>
-            </a:r>
-            <a:endParaRPr lang="fr-FR" sz="2400" b="1" dirty="0"/>
-          </a:p>
-          <a:p>
-            <a:pPr marL="0" indent="0">
-              <a:buNone/>
-            </a:pPr>
-            <a:endParaRPr lang="fr-FR" sz="2400" b="1" dirty="0"/>
-          </a:p>
-          <a:p>
-            <a:pPr marL="0" indent="0">
-              <a:buNone/>
-            </a:pPr>
-            <a:r>
-              <a:rPr lang="en-US" sz="2400" b="1" dirty="0"/>
-              <a:t>More </a:t>
-            </a:r>
-            <a:r>
-              <a:rPr lang="en-US" sz="2400" b="1" dirty="0" err="1"/>
-              <a:t>informations</a:t>
-            </a:r>
-            <a:r>
-              <a:rPr lang="en-US" sz="2400" b="1" dirty="0"/>
-              <a:t>:</a:t>
-            </a:r>
-            <a:r>
-              <a:rPr lang="en-US" sz="2400" dirty="0"/>
-              <a:t> </a:t>
-            </a:r>
-          </a:p>
-          <a:p>
-            <a:pPr marL="0" indent="0">
-              <a:buNone/>
-            </a:pPr>
-            <a:r>
-              <a:rPr lang="en-US" sz="2400" dirty="0">
-                <a:hlinkClick r:id="rId2"/>
-              </a:rPr>
-              <a:t>http://help.triadsemi.com/en/articles/836917-steamvr-tracking-without-an-hmd</a:t>
-            </a:r>
-            <a:endParaRPr lang="en-US" sz="2400" dirty="0"/>
-          </a:p>
-        </p:txBody>
-      </p:sp>
-      <p:sp>
-        <p:nvSpPr>
-          <p:cNvPr id="2" name="Rectangle 1">
-            <a:extLst>
-              <a:ext uri="{FF2B5EF4-FFF2-40B4-BE49-F238E27FC236}">
-                <a16:creationId xmlns:a16="http://schemas.microsoft.com/office/drawing/2014/main" id="{55E31043-2807-4C06-BC67-EEF15BE841A5}"/>
-              </a:ext>
-            </a:extLst>
-          </p:cNvPr>
-          <p:cNvSpPr/>
-          <p:nvPr/>
-        </p:nvSpPr>
-        <p:spPr>
-          <a:xfrm>
-            <a:off x="0" y="0"/>
-            <a:ext cx="12192000" cy="523220"/>
-          </a:xfrm>
-          <a:prstGeom prst="rect">
-            <a:avLst/>
-          </a:prstGeom>
-        </p:spPr>
-        <p:txBody>
-          <a:bodyPr wrap="square">
-            <a:spAutoFit/>
-          </a:bodyPr>
-          <a:lstStyle/>
-          <a:p>
-            <a:r>
-              <a:rPr lang="fr-FR" sz="2800" dirty="0"/>
-              <a:t>Running </a:t>
-            </a:r>
-            <a:r>
-              <a:rPr lang="fr-FR" sz="2800" dirty="0" err="1"/>
-              <a:t>SteamVR</a:t>
-            </a:r>
-            <a:r>
-              <a:rPr lang="fr-FR" sz="2800" dirty="0"/>
-              <a:t> </a:t>
-            </a:r>
-            <a:r>
-              <a:rPr lang="fr-FR" sz="2800" dirty="0" err="1"/>
-              <a:t>with</a:t>
-            </a:r>
-            <a:r>
-              <a:rPr lang="fr-FR" sz="2800" dirty="0"/>
-              <a:t> Vive Trackers </a:t>
-            </a:r>
-            <a:r>
-              <a:rPr lang="fr-FR" sz="2800" dirty="0" err="1"/>
-              <a:t>only</a:t>
-            </a:r>
-            <a:r>
-              <a:rPr lang="fr-FR" sz="2800" dirty="0"/>
-              <a:t> (no HMD)</a:t>
-            </a:r>
-            <a:endParaRPr lang="en-US" sz="2800" dirty="0"/>
+              <a:rPr lang="fr-FR" dirty="0"/>
+              <a:t> configuration</a:t>
+            </a:r>
+            <a:endParaRPr lang="fr-FR" dirty="0"/>
           </a:p>
         </p:txBody>
       </p:sp>
     </p:spTree>
     <p:extLst>
       <p:ext uri="{BB962C8B-B14F-4D97-AF65-F5344CB8AC3E}">
-        <p14:creationId xmlns:p14="http://schemas.microsoft.com/office/powerpoint/2010/main" val="2150512091"/>
+        <p14:creationId xmlns:p14="http://schemas.microsoft.com/office/powerpoint/2010/main" val="3781645063"/>
       </p:ext>
     </p:extLst>
   </p:cSld>
@@ -5845,14 +6136,282 @@
       </p:grpSpPr>
       <p:sp>
         <p:nvSpPr>
-          <p:cNvPr id="4" name="ZoneTexte 3">
-            <a:extLst>
-              <a:ext uri="{FF2B5EF4-FFF2-40B4-BE49-F238E27FC236}">
-                <a16:creationId xmlns:a16="http://schemas.microsoft.com/office/drawing/2014/main" id="{706B6FC1-E7CE-491D-820B-B3FBCE634F55}"/>
-              </a:ext>
-            </a:extLst>
-          </p:cNvPr>
-          <p:cNvSpPr txBox="1"/>
+          <p:cNvPr id="3" name="Espace réservé du contenu 2">
+            <a:extLst>
+              <a:ext uri="{FF2B5EF4-FFF2-40B4-BE49-F238E27FC236}">
+                <a16:creationId xmlns:a16="http://schemas.microsoft.com/office/drawing/2014/main" id="{867BF634-B408-4057-AB03-965020275BA3}"/>
+              </a:ext>
+            </a:extLst>
+          </p:cNvPr>
+          <p:cNvSpPr>
+            <a:spLocks noGrp="1"/>
+          </p:cNvSpPr>
+          <p:nvPr>
+            <p:ph idx="1"/>
+          </p:nvPr>
+        </p:nvSpPr>
+        <p:spPr>
+          <a:xfrm>
+            <a:off x="0" y="855729"/>
+            <a:ext cx="12192000" cy="5999018"/>
+          </a:xfrm>
+        </p:spPr>
+        <p:txBody>
+          <a:bodyPr>
+            <a:normAutofit/>
+          </a:bodyPr>
+          <a:lstStyle/>
+          <a:p>
+            <a:pPr marL="0" indent="0">
+              <a:buNone/>
+            </a:pPr>
+            <a:r>
+              <a:rPr lang="en-US" sz="2400" dirty="0"/>
+              <a:t>Modify these </a:t>
+            </a:r>
+            <a:r>
+              <a:rPr lang="en-US" sz="2400" dirty="0" err="1"/>
+              <a:t>SteamVR</a:t>
+            </a:r>
+            <a:r>
+              <a:rPr lang="en-US" sz="2400" dirty="0"/>
+              <a:t> configuration files:</a:t>
+            </a:r>
+          </a:p>
+          <a:p>
+            <a:r>
+              <a:rPr lang="en-US" sz="2400" dirty="0" err="1"/>
+              <a:t>SteamFolder</a:t>
+            </a:r>
+            <a:r>
+              <a:rPr lang="fr-FR" sz="2400" dirty="0"/>
+              <a:t>/</a:t>
+            </a:r>
+            <a:r>
+              <a:rPr lang="fr-FR" sz="2400" dirty="0" err="1"/>
+              <a:t>steamapps</a:t>
+            </a:r>
+            <a:r>
+              <a:rPr lang="fr-FR" sz="2400" dirty="0"/>
+              <a:t>/</a:t>
+            </a:r>
+            <a:r>
+              <a:rPr lang="fr-FR" sz="2400" dirty="0" err="1"/>
+              <a:t>common</a:t>
+            </a:r>
+            <a:r>
+              <a:rPr lang="fr-FR" sz="2400" dirty="0"/>
+              <a:t>/</a:t>
+            </a:r>
+            <a:r>
+              <a:rPr lang="fr-FR" sz="2400" dirty="0" err="1"/>
+              <a:t>SteamVR</a:t>
+            </a:r>
+            <a:r>
+              <a:rPr lang="fr-FR" sz="2400" dirty="0"/>
+              <a:t>/drivers/</a:t>
+            </a:r>
+            <a:r>
+              <a:rPr lang="fr-FR" sz="2400" dirty="0" err="1"/>
+              <a:t>null</a:t>
+            </a:r>
+            <a:r>
+              <a:rPr lang="fr-FR" sz="2400" dirty="0"/>
+              <a:t>/</a:t>
+            </a:r>
+            <a:r>
+              <a:rPr lang="fr-FR" sz="2400" dirty="0" err="1"/>
+              <a:t>resources</a:t>
+            </a:r>
+            <a:r>
+              <a:rPr lang="fr-FR" sz="2400" dirty="0"/>
+              <a:t>/settings/</a:t>
+            </a:r>
+            <a:r>
+              <a:rPr lang="fr-FR" sz="2400" dirty="0" err="1"/>
+              <a:t>default.vrsettings</a:t>
+            </a:r>
+            <a:r>
+              <a:rPr lang="en-US" sz="2400" dirty="0"/>
+              <a:t>	</a:t>
+            </a:r>
+          </a:p>
+          <a:p>
+            <a:pPr marL="0" lvl="1" indent="0">
+              <a:spcBef>
+                <a:spcPts val="1000"/>
+              </a:spcBef>
+              <a:buNone/>
+            </a:pPr>
+            <a:r>
+              <a:rPr lang="en-US" dirty="0"/>
+              <a:t>	&gt; set </a:t>
+            </a:r>
+            <a:r>
+              <a:rPr lang="en-US" b="1" dirty="0"/>
+              <a:t>enable</a:t>
+            </a:r>
+            <a:r>
+              <a:rPr lang="en-US" dirty="0"/>
+              <a:t> to </a:t>
+            </a:r>
+            <a:r>
+              <a:rPr lang="en-US" b="1" dirty="0"/>
+              <a:t>true</a:t>
+            </a:r>
+          </a:p>
+          <a:p>
+            <a:r>
+              <a:rPr lang="en-US" sz="2400" dirty="0" err="1"/>
+              <a:t>SteamFolder</a:t>
+            </a:r>
+            <a:r>
+              <a:rPr lang="en-US" sz="2400" dirty="0"/>
+              <a:t>/</a:t>
+            </a:r>
+            <a:r>
+              <a:rPr lang="en-US" sz="2400" dirty="0" err="1"/>
+              <a:t>steamapps</a:t>
+            </a:r>
+            <a:r>
+              <a:rPr lang="en-US" sz="2400" dirty="0"/>
+              <a:t>/common/</a:t>
+            </a:r>
+            <a:r>
+              <a:rPr lang="en-US" sz="2400" dirty="0" err="1"/>
+              <a:t>SteamVR</a:t>
+            </a:r>
+            <a:r>
+              <a:rPr lang="en-US" sz="2400" dirty="0"/>
+              <a:t>/resources/settings/</a:t>
+            </a:r>
+            <a:r>
+              <a:rPr lang="en-US" sz="2400" dirty="0" err="1"/>
+              <a:t>default.vrsettings</a:t>
+            </a:r>
+            <a:endParaRPr lang="fr-FR" sz="2400" dirty="0"/>
+          </a:p>
+          <a:p>
+            <a:pPr marL="0" indent="0">
+              <a:buNone/>
+            </a:pPr>
+            <a:r>
+              <a:rPr lang="fr-FR" sz="2400" dirty="0"/>
+              <a:t>	&gt; set </a:t>
+            </a:r>
+            <a:r>
+              <a:rPr lang="fr-FR" sz="2400" b="1" dirty="0" err="1"/>
+              <a:t>requireHmd</a:t>
+            </a:r>
+            <a:r>
+              <a:rPr lang="fr-FR" sz="2400" b="1" dirty="0"/>
+              <a:t> </a:t>
+            </a:r>
+            <a:r>
+              <a:rPr lang="fr-FR" sz="2400" dirty="0"/>
+              <a:t>to </a:t>
+            </a:r>
+            <a:r>
+              <a:rPr lang="fr-FR" sz="2400" b="1" dirty="0"/>
+              <a:t>false</a:t>
+            </a:r>
+            <a:endParaRPr lang="fr-FR" sz="2400" dirty="0"/>
+          </a:p>
+          <a:p>
+            <a:pPr marL="0" indent="0">
+              <a:buNone/>
+            </a:pPr>
+            <a:r>
+              <a:rPr lang="fr-FR" sz="2400" dirty="0"/>
+              <a:t>	&gt; set </a:t>
+            </a:r>
+            <a:r>
+              <a:rPr lang="fr-FR" sz="2400" b="1" dirty="0" err="1"/>
+              <a:t>forcedDriver</a:t>
+            </a:r>
+            <a:r>
+              <a:rPr lang="fr-FR" sz="2400" dirty="0"/>
+              <a:t> to </a:t>
+            </a:r>
+            <a:r>
+              <a:rPr lang="fr-FR" sz="2400" b="1" dirty="0" err="1"/>
+              <a:t>null</a:t>
+            </a:r>
+            <a:endParaRPr lang="fr-FR" sz="2400" b="1" dirty="0"/>
+          </a:p>
+          <a:p>
+            <a:pPr marL="0" indent="0">
+              <a:buNone/>
+            </a:pPr>
+            <a:r>
+              <a:rPr lang="fr-FR" sz="2400" dirty="0"/>
+              <a:t>	&gt; set </a:t>
+            </a:r>
+            <a:r>
+              <a:rPr lang="fr-FR" sz="2400" b="1" dirty="0" err="1"/>
+              <a:t>activateMultipleDrivers</a:t>
+            </a:r>
+            <a:r>
+              <a:rPr lang="fr-FR" sz="2400" dirty="0"/>
+              <a:t> to </a:t>
+            </a:r>
+            <a:r>
+              <a:rPr lang="fr-FR" sz="2400" b="1" dirty="0" err="1"/>
+              <a:t>true</a:t>
+            </a:r>
+            <a:endParaRPr lang="fr-FR" sz="2400" b="1" dirty="0"/>
+          </a:p>
+          <a:p>
+            <a:pPr marL="0" indent="0">
+              <a:buNone/>
+            </a:pPr>
+            <a:endParaRPr lang="fr-FR" sz="2400" b="1" dirty="0"/>
+          </a:p>
+          <a:p>
+            <a:pPr marL="0" indent="0">
+              <a:buNone/>
+            </a:pPr>
+            <a:r>
+              <a:rPr lang="en-US" sz="2400" b="1" dirty="0"/>
+              <a:t>More </a:t>
+            </a:r>
+            <a:r>
+              <a:rPr lang="en-US" sz="2400" b="1" dirty="0" err="1"/>
+              <a:t>informations</a:t>
+            </a:r>
+            <a:r>
+              <a:rPr lang="en-US" sz="2400" b="1" dirty="0"/>
+              <a:t>:</a:t>
+            </a:r>
+            <a:r>
+              <a:rPr lang="en-US" sz="2400" dirty="0"/>
+              <a:t> </a:t>
+            </a:r>
+          </a:p>
+          <a:p>
+            <a:pPr marL="0" indent="0">
+              <a:buNone/>
+            </a:pPr>
+            <a:r>
+              <a:rPr lang="en-US" sz="2400" dirty="0">
+                <a:hlinkClick r:id="rId2"/>
+              </a:rPr>
+              <a:t>http://help.triadsemi.com/en/articles/836917-steamvr-tracking-without-an-hmd</a:t>
+            </a:r>
+            <a:endParaRPr lang="en-US" sz="2400" dirty="0"/>
+          </a:p>
+        </p:txBody>
+      </p:sp>
+      <p:sp>
+        <p:nvSpPr>
+          <p:cNvPr id="2" name="Rectangle 1">
+            <a:extLst>
+              <a:ext uri="{FF2B5EF4-FFF2-40B4-BE49-F238E27FC236}">
+                <a16:creationId xmlns:a16="http://schemas.microsoft.com/office/drawing/2014/main" id="{55E31043-2807-4C06-BC67-EEF15BE841A5}"/>
+              </a:ext>
+            </a:extLst>
+          </p:cNvPr>
+          <p:cNvSpPr/>
           <p:nvPr/>
         </p:nvSpPr>
         <p:spPr>
@@ -5863,254 +6422,49 @@
           <a:prstGeom prst="rect">
             <a:avLst/>
           </a:prstGeom>
-          <a:noFill/>
         </p:spPr>
         <p:txBody>
-          <a:bodyPr wrap="square" rtlCol="0">
+          <a:bodyPr wrap="square">
             <a:spAutoFit/>
           </a:bodyPr>
           <a:lstStyle/>
           <a:p>
             <a:r>
-              <a:rPr lang="en-US" sz="2800" dirty="0"/>
-              <a:t>Set </a:t>
-            </a:r>
-            <a:r>
-              <a:rPr lang="en-US" sz="2800" dirty="0" err="1"/>
+              <a:rPr lang="fr-FR" sz="2800" dirty="0"/>
+              <a:t>Running </a:t>
+            </a:r>
+            <a:r>
+              <a:rPr lang="fr-FR" sz="2800" dirty="0" err="1"/>
               <a:t>SteamVR</a:t>
             </a:r>
             <a:r>
-              <a:rPr lang="en-US" sz="2800" dirty="0"/>
-              <a:t> properties in Steam</a:t>
-            </a:r>
-          </a:p>
-        </p:txBody>
-      </p:sp>
-      <p:sp>
-        <p:nvSpPr>
-          <p:cNvPr id="5" name="ZoneTexte 4">
-            <a:extLst>
-              <a:ext uri="{FF2B5EF4-FFF2-40B4-BE49-F238E27FC236}">
-                <a16:creationId xmlns:a16="http://schemas.microsoft.com/office/drawing/2014/main" id="{527C78EF-8E2D-4CB3-B018-69B620090FEB}"/>
-              </a:ext>
-            </a:extLst>
-          </p:cNvPr>
-          <p:cNvSpPr txBox="1"/>
-          <p:nvPr/>
-        </p:nvSpPr>
-        <p:spPr>
-          <a:xfrm>
-            <a:off x="1205344" y="5978497"/>
-            <a:ext cx="9660835" cy="707886"/>
-          </a:xfrm>
-          <a:prstGeom prst="rect">
-            <a:avLst/>
-          </a:prstGeom>
-          <a:noFill/>
-        </p:spPr>
-        <p:txBody>
-          <a:bodyPr wrap="square" rtlCol="0">
-            <a:spAutoFit/>
-          </a:bodyPr>
-          <a:lstStyle/>
-          <a:p>
-            <a:r>
-              <a:rPr lang="en-US" sz="2000" b="1" u="sng" dirty="0">
-                <a:solidFill>
-                  <a:srgbClr val="FF0000"/>
-                </a:solidFill>
-              </a:rPr>
-              <a:t>NB :</a:t>
-            </a:r>
-            <a:r>
-              <a:rPr lang="en-US" sz="2000" b="1" dirty="0">
-                <a:solidFill>
-                  <a:srgbClr val="FF0000"/>
-                </a:solidFill>
-              </a:rPr>
-              <a:t> Be careful when Steam performs a </a:t>
-            </a:r>
-            <a:r>
-              <a:rPr lang="en-US" sz="2000" b="1" dirty="0" err="1">
-                <a:solidFill>
-                  <a:srgbClr val="FF0000"/>
-                </a:solidFill>
-              </a:rPr>
-              <a:t>SteamVR</a:t>
-            </a:r>
-            <a:r>
-              <a:rPr lang="en-US" sz="2000" b="1" dirty="0">
-                <a:solidFill>
-                  <a:srgbClr val="FF0000"/>
-                </a:solidFill>
-              </a:rPr>
-              <a:t> update : </a:t>
-            </a:r>
-          </a:p>
-          <a:p>
-            <a:r>
-              <a:rPr lang="en-US" sz="2000" b="1" dirty="0" err="1">
-                <a:solidFill>
-                  <a:srgbClr val="FF0000"/>
-                </a:solidFill>
-              </a:rPr>
-              <a:t>default.vrsettings</a:t>
-            </a:r>
-            <a:r>
-              <a:rPr lang="en-US" sz="2000" b="1" dirty="0">
-                <a:solidFill>
-                  <a:srgbClr val="FF0000"/>
-                </a:solidFill>
-              </a:rPr>
-              <a:t> files could be overridden with new ones !!!</a:t>
-            </a:r>
-          </a:p>
-        </p:txBody>
-      </p:sp>
-      <p:pic>
-        <p:nvPicPr>
-          <p:cNvPr id="2" name="Image 1">
-            <a:extLst>
-              <a:ext uri="{FF2B5EF4-FFF2-40B4-BE49-F238E27FC236}">
-                <a16:creationId xmlns:a16="http://schemas.microsoft.com/office/drawing/2014/main" id="{CC3E2569-83FC-4531-A73F-CCC288F4A27A}"/>
-              </a:ext>
-            </a:extLst>
-          </p:cNvPr>
-          <p:cNvPicPr>
-            <a:picLocks noChangeAspect="1"/>
-          </p:cNvPicPr>
-          <p:nvPr/>
-        </p:nvPicPr>
-        <p:blipFill>
-          <a:blip r:embed="rId2"/>
-          <a:stretch>
-            <a:fillRect/>
-          </a:stretch>
-        </p:blipFill>
-        <p:spPr>
-          <a:xfrm>
-            <a:off x="1205344" y="580465"/>
-            <a:ext cx="9781309" cy="5144775"/>
-          </a:xfrm>
-          <a:prstGeom prst="rect">
-            <a:avLst/>
-          </a:prstGeom>
-        </p:spPr>
-      </p:pic>
-      <p:sp>
-        <p:nvSpPr>
-          <p:cNvPr id="6" name="ZoneTexte 5">
-            <a:extLst>
-              <a:ext uri="{FF2B5EF4-FFF2-40B4-BE49-F238E27FC236}">
-                <a16:creationId xmlns:a16="http://schemas.microsoft.com/office/drawing/2014/main" id="{527C78EF-8E2D-4CB3-B018-69B620090FEB}"/>
-              </a:ext>
-            </a:extLst>
-          </p:cNvPr>
-          <p:cNvSpPr txBox="1"/>
-          <p:nvPr/>
-        </p:nvSpPr>
-        <p:spPr>
-          <a:xfrm>
-            <a:off x="4136836" y="965727"/>
-            <a:ext cx="2365565" cy="1345673"/>
-          </a:xfrm>
-          <a:prstGeom prst="rect">
-            <a:avLst/>
-          </a:prstGeom>
-          <a:noFill/>
-        </p:spPr>
-        <p:txBody>
-          <a:bodyPr wrap="square" rtlCol="0">
-            <a:spAutoFit/>
-          </a:bodyPr>
-          <a:lstStyle/>
-          <a:p>
-            <a:r>
-              <a:rPr lang="en-US" sz="2000" dirty="0">
-                <a:solidFill>
-                  <a:srgbClr val="FF0000"/>
-                </a:solidFill>
-              </a:rPr>
-              <a:t>Force </a:t>
-            </a:r>
-            <a:r>
-              <a:rPr lang="en-US" sz="2000" dirty="0" err="1">
-                <a:solidFill>
-                  <a:srgbClr val="FF0000"/>
-                </a:solidFill>
-              </a:rPr>
-              <a:t>SteamVR</a:t>
-            </a:r>
-            <a:r>
-              <a:rPr lang="en-US" sz="2000" dirty="0">
-                <a:solidFill>
-                  <a:srgbClr val="FF0000"/>
-                </a:solidFill>
-              </a:rPr>
-              <a:t> to update itself only when Steam is launched</a:t>
-            </a:r>
-          </a:p>
-        </p:txBody>
-      </p:sp>
-      <p:sp>
-        <p:nvSpPr>
-          <p:cNvPr id="7" name="ZoneTexte 6">
-            <a:extLst>
-              <a:ext uri="{FF2B5EF4-FFF2-40B4-BE49-F238E27FC236}">
-                <a16:creationId xmlns:a16="http://schemas.microsoft.com/office/drawing/2014/main" id="{5EC53674-DAEF-4D23-87E5-32761CD4ED44}"/>
-              </a:ext>
-            </a:extLst>
-          </p:cNvPr>
-          <p:cNvSpPr txBox="1"/>
-          <p:nvPr/>
-        </p:nvSpPr>
-        <p:spPr>
-          <a:xfrm>
-            <a:off x="6179129" y="2079405"/>
-            <a:ext cx="4807524" cy="1015663"/>
-          </a:xfrm>
-          <a:prstGeom prst="rect">
-            <a:avLst/>
-          </a:prstGeom>
-          <a:noFill/>
-        </p:spPr>
-        <p:txBody>
-          <a:bodyPr wrap="square" rtlCol="0">
-            <a:spAutoFit/>
-          </a:bodyPr>
-          <a:lstStyle/>
-          <a:p>
-            <a:r>
-              <a:rPr lang="en-US" sz="2000" dirty="0">
-                <a:solidFill>
-                  <a:srgbClr val="FF0000"/>
-                </a:solidFill>
-              </a:rPr>
-              <a:t>Recent versions of  </a:t>
-            </a:r>
-            <a:r>
-              <a:rPr lang="en-US" sz="2000" dirty="0" err="1">
-                <a:solidFill>
-                  <a:srgbClr val="FF0000"/>
-                </a:solidFill>
-              </a:rPr>
-              <a:t>SteamVR</a:t>
-            </a:r>
-            <a:r>
-              <a:rPr lang="en-US" sz="2000" dirty="0">
-                <a:solidFill>
-                  <a:srgbClr val="FF0000"/>
-                </a:solidFill>
-              </a:rPr>
-              <a:t> have good support for Vive Trackers. So, you can avoid beta versions.</a:t>
-            </a:r>
+              <a:rPr lang="fr-FR" sz="2800" dirty="0"/>
+              <a:t> </a:t>
+            </a:r>
+            <a:r>
+              <a:rPr lang="fr-FR" sz="2800" dirty="0" err="1"/>
+              <a:t>with</a:t>
+            </a:r>
+            <a:r>
+              <a:rPr lang="fr-FR" sz="2800" dirty="0"/>
+              <a:t> Vive Trackers </a:t>
+            </a:r>
+            <a:r>
+              <a:rPr lang="fr-FR" sz="2800" dirty="0" err="1"/>
+              <a:t>only</a:t>
+            </a:r>
+            <a:r>
+              <a:rPr lang="fr-FR" sz="2800" dirty="0"/>
+              <a:t> (no HMD)</a:t>
+            </a:r>
+            <a:endParaRPr lang="en-US" sz="2800" dirty="0"/>
           </a:p>
         </p:txBody>
       </p:sp>
     </p:spTree>
     <p:extLst>
       <p:ext uri="{BB962C8B-B14F-4D97-AF65-F5344CB8AC3E}">
-        <p14:creationId xmlns:p14="http://schemas.microsoft.com/office/powerpoint/2010/main" val="2240185844"/>
+        <p14:creationId xmlns:p14="http://schemas.microsoft.com/office/powerpoint/2010/main" val="2150512091"/>
       </p:ext>
     </p:extLst>
   </p:cSld>
@@ -6139,33 +6493,264 @@
       </p:grpSpPr>
       <p:sp>
         <p:nvSpPr>
-          <p:cNvPr id="2" name="Titre 1">
-            <a:extLst>
-              <a:ext uri="{FF2B5EF4-FFF2-40B4-BE49-F238E27FC236}">
-                <a16:creationId xmlns:a16="http://schemas.microsoft.com/office/drawing/2014/main" id="{CD27C932-A795-4BDA-8F0E-5A1627F64C61}"/>
-              </a:ext>
-            </a:extLst>
-          </p:cNvPr>
-          <p:cNvSpPr>
-            <a:spLocks noGrp="1"/>
-          </p:cNvSpPr>
-          <p:nvPr>
-            <p:ph type="ctrTitle"/>
-          </p:nvPr>
+          <p:cNvPr id="4" name="ZoneTexte 3">
+            <a:extLst>
+              <a:ext uri="{FF2B5EF4-FFF2-40B4-BE49-F238E27FC236}">
+                <a16:creationId xmlns:a16="http://schemas.microsoft.com/office/drawing/2014/main" id="{706B6FC1-E7CE-491D-820B-B3FBCE634F55}"/>
+              </a:ext>
+            </a:extLst>
+          </p:cNvPr>
+          <p:cNvSpPr txBox="1"/>
+          <p:nvPr/>
         </p:nvSpPr>
         <p:spPr>
           <a:xfrm>
-            <a:off x="1192530" y="2235200"/>
-            <a:ext cx="9806940" cy="2387600"/>
+            <a:off x="0" y="0"/>
+            <a:ext cx="12192000" cy="523220"/>
           </a:xfrm>
+          <a:prstGeom prst="rect">
+            <a:avLst/>
+          </a:prstGeom>
+          <a:noFill/>
         </p:spPr>
         <p:txBody>
-          <a:bodyPr anchor="ctr"/>
-          <a:lstStyle/>
-          <a:p>
-            <a:r>
-              <a:rPr lang="en-US" dirty="0"/>
-              <a:t>Optimize Vive Trackers connection reliability</a:t>
+          <a:bodyPr wrap="square" rtlCol="0">
+            <a:spAutoFit/>
+          </a:bodyPr>
+          <a:lstStyle/>
+          <a:p>
+            <a:r>
+              <a:rPr lang="en-US" sz="2800" dirty="0"/>
+              <a:t>Set </a:t>
+            </a:r>
+            <a:r>
+              <a:rPr lang="en-US" sz="2800" dirty="0" err="1"/>
+              <a:t>SteamVR</a:t>
+            </a:r>
+            <a:r>
+              <a:rPr lang="en-US" sz="2800" dirty="0"/>
+              <a:t> properties in Steam</a:t>
+            </a:r>
+          </a:p>
+        </p:txBody>
+      </p:sp>
+      <p:sp>
+        <p:nvSpPr>
+          <p:cNvPr id="5" name="ZoneTexte 4">
+            <a:extLst>
+              <a:ext uri="{FF2B5EF4-FFF2-40B4-BE49-F238E27FC236}">
+                <a16:creationId xmlns:a16="http://schemas.microsoft.com/office/drawing/2014/main" id="{527C78EF-8E2D-4CB3-B018-69B620090FEB}"/>
+              </a:ext>
+            </a:extLst>
+          </p:cNvPr>
+          <p:cNvSpPr txBox="1"/>
+          <p:nvPr/>
+        </p:nvSpPr>
+        <p:spPr>
+          <a:xfrm>
+            <a:off x="1205344" y="5978497"/>
+            <a:ext cx="9660835" cy="707886"/>
+          </a:xfrm>
+          <a:prstGeom prst="rect">
+            <a:avLst/>
+          </a:prstGeom>
+          <a:noFill/>
+        </p:spPr>
+        <p:txBody>
+          <a:bodyPr wrap="square" rtlCol="0">
+            <a:spAutoFit/>
+          </a:bodyPr>
+          <a:lstStyle/>
+          <a:p>
+            <a:r>
+              <a:rPr lang="en-US" sz="2000" b="1" u="sng" dirty="0">
+                <a:solidFill>
+                  <a:srgbClr val="FF0000"/>
+                </a:solidFill>
+              </a:rPr>
+              <a:t>NB :</a:t>
+            </a:r>
+            <a:r>
+              <a:rPr lang="en-US" sz="2000" b="1" dirty="0">
+                <a:solidFill>
+                  <a:srgbClr val="FF0000"/>
+                </a:solidFill>
+              </a:rPr>
+              <a:t> Be careful when Steam performs a </a:t>
+            </a:r>
+            <a:r>
+              <a:rPr lang="en-US" sz="2000" b="1" dirty="0" err="1">
+                <a:solidFill>
+                  <a:srgbClr val="FF0000"/>
+                </a:solidFill>
+              </a:rPr>
+              <a:t>SteamVR</a:t>
+            </a:r>
+            <a:r>
+              <a:rPr lang="en-US" sz="2000" b="1" dirty="0">
+                <a:solidFill>
+                  <a:srgbClr val="FF0000"/>
+                </a:solidFill>
+              </a:rPr>
+              <a:t> update : </a:t>
+            </a:r>
+          </a:p>
+          <a:p>
+            <a:r>
+              <a:rPr lang="en-US" sz="2000" b="1" dirty="0" err="1">
+                <a:solidFill>
+                  <a:srgbClr val="FF0000"/>
+                </a:solidFill>
+              </a:rPr>
+              <a:t>default.vrsettings</a:t>
+            </a:r>
+            <a:r>
+              <a:rPr lang="en-US" sz="2000" b="1" dirty="0">
+                <a:solidFill>
+                  <a:srgbClr val="FF0000"/>
+                </a:solidFill>
+              </a:rPr>
+              <a:t> files could be overridden with new ones !!!</a:t>
+            </a:r>
+          </a:p>
+        </p:txBody>
+      </p:sp>
+      <p:pic>
+        <p:nvPicPr>
+          <p:cNvPr id="2" name="Image 1">
+            <a:extLst>
+              <a:ext uri="{FF2B5EF4-FFF2-40B4-BE49-F238E27FC236}">
+                <a16:creationId xmlns:a16="http://schemas.microsoft.com/office/drawing/2014/main" id="{CC3E2569-83FC-4531-A73F-CCC288F4A27A}"/>
+              </a:ext>
+            </a:extLst>
+          </p:cNvPr>
+          <p:cNvPicPr>
+            <a:picLocks noChangeAspect="1"/>
+          </p:cNvPicPr>
+          <p:nvPr/>
+        </p:nvPicPr>
+        <p:blipFill>
+          <a:blip r:embed="rId2"/>
+          <a:stretch>
+            <a:fillRect/>
+          </a:stretch>
+        </p:blipFill>
+        <p:spPr>
+          <a:xfrm>
+            <a:off x="1205344" y="580465"/>
+            <a:ext cx="9781309" cy="5144775"/>
+          </a:xfrm>
+          <a:prstGeom prst="rect">
+            <a:avLst/>
+          </a:prstGeom>
+        </p:spPr>
+      </p:pic>
+      <p:sp>
+        <p:nvSpPr>
+          <p:cNvPr id="6" name="ZoneTexte 5">
+            <a:extLst>
+              <a:ext uri="{FF2B5EF4-FFF2-40B4-BE49-F238E27FC236}">
+                <a16:creationId xmlns:a16="http://schemas.microsoft.com/office/drawing/2014/main" id="{527C78EF-8E2D-4CB3-B018-69B620090FEB}"/>
+              </a:ext>
+            </a:extLst>
+          </p:cNvPr>
+          <p:cNvSpPr txBox="1"/>
+          <p:nvPr/>
+        </p:nvSpPr>
+        <p:spPr>
+          <a:xfrm>
+            <a:off x="4136836" y="965727"/>
+            <a:ext cx="2365565" cy="1345673"/>
+          </a:xfrm>
+          <a:prstGeom prst="rect">
+            <a:avLst/>
+          </a:prstGeom>
+          <a:noFill/>
+        </p:spPr>
+        <p:txBody>
+          <a:bodyPr wrap="square" rtlCol="0">
+            <a:spAutoFit/>
+          </a:bodyPr>
+          <a:lstStyle/>
+          <a:p>
+            <a:r>
+              <a:rPr lang="en-US" sz="2000" dirty="0">
+                <a:solidFill>
+                  <a:srgbClr val="FF0000"/>
+                </a:solidFill>
+              </a:rPr>
+              <a:t>Force </a:t>
+            </a:r>
+            <a:r>
+              <a:rPr lang="en-US" sz="2000" dirty="0" err="1">
+                <a:solidFill>
+                  <a:srgbClr val="FF0000"/>
+                </a:solidFill>
+              </a:rPr>
+              <a:t>SteamVR</a:t>
+            </a:r>
+            <a:r>
+              <a:rPr lang="en-US" sz="2000" dirty="0">
+                <a:solidFill>
+                  <a:srgbClr val="FF0000"/>
+                </a:solidFill>
+              </a:rPr>
+              <a:t> to update itself only when Steam is launched</a:t>
+            </a:r>
+          </a:p>
+        </p:txBody>
+      </p:sp>
+      <p:sp>
+        <p:nvSpPr>
+          <p:cNvPr id="7" name="ZoneTexte 6">
+            <a:extLst>
+              <a:ext uri="{FF2B5EF4-FFF2-40B4-BE49-F238E27FC236}">
+                <a16:creationId xmlns:a16="http://schemas.microsoft.com/office/drawing/2014/main" id="{5EC53674-DAEF-4D23-87E5-32761CD4ED44}"/>
+              </a:ext>
+            </a:extLst>
+          </p:cNvPr>
+          <p:cNvSpPr txBox="1"/>
+          <p:nvPr/>
+        </p:nvSpPr>
+        <p:spPr>
+          <a:xfrm>
+            <a:off x="6179129" y="2079405"/>
+            <a:ext cx="4807524" cy="1015663"/>
+          </a:xfrm>
+          <a:prstGeom prst="rect">
+            <a:avLst/>
+          </a:prstGeom>
+          <a:noFill/>
+        </p:spPr>
+        <p:txBody>
+          <a:bodyPr wrap="square" rtlCol="0">
+            <a:spAutoFit/>
+          </a:bodyPr>
+          <a:lstStyle/>
+          <a:p>
+            <a:r>
+              <a:rPr lang="en-US" sz="2000" dirty="0">
+                <a:solidFill>
+                  <a:srgbClr val="FF0000"/>
+                </a:solidFill>
+              </a:rPr>
+              <a:t>Recent versions of  </a:t>
+            </a:r>
+            <a:r>
+              <a:rPr lang="en-US" sz="2000" dirty="0" err="1">
+                <a:solidFill>
+                  <a:srgbClr val="FF0000"/>
+                </a:solidFill>
+              </a:rPr>
+              <a:t>SteamVR</a:t>
+            </a:r>
+            <a:r>
+              <a:rPr lang="en-US" sz="2000" dirty="0">
+                <a:solidFill>
+                  <a:srgbClr val="FF0000"/>
+                </a:solidFill>
+              </a:rPr>
+              <a:t> have good support for Vive Trackers. So, you can avoid beta versions.</a:t>
             </a:r>
           </a:p>
         </p:txBody>
@@ -6173,7 +6758,7 @@
     </p:spTree>
     <p:extLst>
       <p:ext uri="{BB962C8B-B14F-4D97-AF65-F5344CB8AC3E}">
-        <p14:creationId xmlns:p14="http://schemas.microsoft.com/office/powerpoint/2010/main" val="3088536781"/>
+        <p14:creationId xmlns:p14="http://schemas.microsoft.com/office/powerpoint/2010/main" val="2240185844"/>
       </p:ext>
     </p:extLst>
   </p:cSld>
@@ -6202,79 +6787,46 @@
       </p:grpSpPr>
       <p:sp>
         <p:nvSpPr>
-          <p:cNvPr id="4" name="ZoneTexte 3">
-            <a:extLst>
-              <a:ext uri="{FF2B5EF4-FFF2-40B4-BE49-F238E27FC236}">
-                <a16:creationId xmlns:a16="http://schemas.microsoft.com/office/drawing/2014/main" id="{706B6FC1-E7CE-491D-820B-B3FBCE634F55}"/>
-              </a:ext>
-            </a:extLst>
-          </p:cNvPr>
-          <p:cNvSpPr txBox="1"/>
-          <p:nvPr/>
+          <p:cNvPr id="2" name="Titre 1">
+            <a:extLst>
+              <a:ext uri="{FF2B5EF4-FFF2-40B4-BE49-F238E27FC236}">
+                <a16:creationId xmlns:a16="http://schemas.microsoft.com/office/drawing/2014/main" id="{CD27C932-A795-4BDA-8F0E-5A1627F64C61}"/>
+              </a:ext>
+            </a:extLst>
+          </p:cNvPr>
+          <p:cNvSpPr>
+            <a:spLocks noGrp="1"/>
+          </p:cNvSpPr>
+          <p:nvPr>
+            <p:ph type="ctrTitle"/>
+          </p:nvPr>
         </p:nvSpPr>
         <p:spPr>
           <a:xfrm>
-            <a:off x="0" y="0"/>
-            <a:ext cx="12192000" cy="523220"/>
+            <a:off x="1192530" y="2235200"/>
+            <a:ext cx="9806940" cy="2387600"/>
           </a:xfrm>
-          <a:prstGeom prst="rect">
-            <a:avLst/>
-          </a:prstGeom>
-          <a:noFill/>
         </p:spPr>
         <p:txBody>
-          <a:bodyPr wrap="square" rtlCol="0">
-            <a:spAutoFit/>
-          </a:bodyPr>
-          <a:lstStyle/>
-          <a:p>
-            <a:r>
-              <a:rPr lang="fr-FR" sz="2800" dirty="0"/>
-              <a:t>Configure Windows Power Options</a:t>
-            </a:r>
-          </a:p>
-        </p:txBody>
-      </p:sp>
-      <p:pic>
-        <p:nvPicPr>
-          <p:cNvPr id="6" name="Image 5" descr="Une image contenant capture d’écran&#10;&#10;Description générée automatiquement">
-            <a:extLst>
-              <a:ext uri="{FF2B5EF4-FFF2-40B4-BE49-F238E27FC236}">
-                <a16:creationId xmlns:a16="http://schemas.microsoft.com/office/drawing/2014/main" id="{DC7BADEE-3314-462E-9A28-6B40B002DAE7}"/>
-              </a:ext>
-            </a:extLst>
-          </p:cNvPr>
-          <p:cNvPicPr>
-            <a:picLocks noChangeAspect="1"/>
-          </p:cNvPicPr>
-          <p:nvPr/>
-        </p:nvPicPr>
-        <p:blipFill>
-          <a:blip r:embed="rId2">
-            <a:extLst>
-              <a:ext uri="{28A0092B-C50C-407E-A947-70E740481C1C}">
-                <a14:useLocalDpi xmlns:a14="http://schemas.microsoft.com/office/drawing/2010/main" val="0"/>
-              </a:ext>
-            </a:extLst>
-          </a:blip>
-          <a:stretch>
-            <a:fillRect/>
-          </a:stretch>
-        </p:blipFill>
-        <p:spPr>
-          <a:xfrm>
-            <a:off x="1250156" y="523220"/>
-            <a:ext cx="9179719" cy="6250021"/>
-          </a:xfrm>
-          <a:prstGeom prst="rect">
-            <a:avLst/>
-          </a:prstGeom>
-        </p:spPr>
-      </p:pic>
+          <a:bodyPr anchor="ctr"/>
+          <a:lstStyle/>
+          <a:p>
+            <a:r>
+              <a:rPr lang="en-US" dirty="0" smtClean="0"/>
+              <a:t>3. </a:t>
+            </a:r>
+            <a:r>
+              <a:rPr lang="en-US" dirty="0"/>
+              <a:t>Optimize tracking reliability</a:t>
+            </a:r>
+            <a:endParaRPr lang="en-US" dirty="0"/>
+          </a:p>
+        </p:txBody>
+      </p:sp>
     </p:spTree>
     <p:extLst>
       <p:ext uri="{BB962C8B-B14F-4D97-AF65-F5344CB8AC3E}">
-        <p14:creationId xmlns:p14="http://schemas.microsoft.com/office/powerpoint/2010/main" val="1255640821"/>
+        <p14:creationId xmlns:p14="http://schemas.microsoft.com/office/powerpoint/2010/main" val="3088536781"/>
       </p:ext>
     </p:extLst>
   </p:cSld>

</xml_diff>